<commit_message>
mean std rms .py
</commit_message>
<xml_diff>
--- a/Report/Termin_05_07_Nikita.pptx
+++ b/Report/Termin_05_07_Nikita.pptx
@@ -10,6 +10,8 @@
     <p:sldId id="258" r:id="rId4"/>
     <p:sldId id="259" r:id="rId5"/>
     <p:sldId id="260" r:id="rId6"/>
+    <p:sldId id="261" r:id="rId7"/>
+    <p:sldId id="262" r:id="rId8"/>
   </p:sldIdLst>
   <p:sldSz cx="12192000" cy="6858000"/>
   <p:notesSz cx="6858000" cy="9144000"/>
@@ -116,6 +118,303 @@
 </p:presentation>
 </file>
 
+<file path=ppt/ink/ink1.xml><?xml version="1.0" encoding="utf-8"?>
+<inkml:ink xmlns:inkml="http://www.w3.org/2003/InkML">
+  <inkml:definitions>
+    <inkml:context xml:id="ctx0">
+      <inkml:inkSource xml:id="inkSrc0">
+        <inkml:traceFormat>
+          <inkml:channel name="X" type="integer" min="-2.14748E9" max="2.14748E9" units="cm"/>
+          <inkml:channel name="Y" type="integer" min="-2.14748E9" max="2.14748E9" units="cm"/>
+          <inkml:channel name="F" type="integer" max="32767" units="dev"/>
+        </inkml:traceFormat>
+        <inkml:channelProperties>
+          <inkml:channelProperty channel="X" name="resolution" value="1000" units="1/cm"/>
+          <inkml:channelProperty channel="Y" name="resolution" value="1000" units="1/cm"/>
+          <inkml:channelProperty channel="F" name="resolution" value="0" units="1/dev"/>
+        </inkml:channelProperties>
+      </inkml:inkSource>
+      <inkml:timestamp xml:id="ts0" timeString="2022-07-04T23:37:45.024"/>
+    </inkml:context>
+    <inkml:brush xml:id="br0">
+      <inkml:brushProperty name="width" value="0.05" units="cm"/>
+      <inkml:brushProperty name="height" value="0.05" units="cm"/>
+    </inkml:brush>
+  </inkml:definitions>
+  <inkml:trace contextRef="#ctx0" brushRef="#br0">18 126 24575,'-2'0'0,"1"1"0,0-1 0,0 1 0,0 0 0,1-1 0,-1 1 0,0 0 0,0 0 0,0-1 0,0 1 0,1 0 0,-1 0 0,0 0 0,1 0 0,-1 0 0,1 0 0,-1 0 0,1 0 0,-1 0 0,1 0 0,0 1 0,-1-1 0,1 0 0,0 0 0,0 0 0,0 0 0,0 1 0,0-1 0,0 1 0,1 37 0,5-18 0,0-1 0,2 1 0,0-2 0,1 1 0,1-1 0,17 25 0,3 7 0,-26-45 0,0 0 0,0-1 0,1 1 0,0-1 0,0 0 0,0 0 0,1 0 0,-1-1 0,1 0 0,8 5 0,73 31 0,-8-4 0,-56-24 0,1 0 0,0-2 0,0-1 0,1-1 0,0-1 0,0-1 0,1-2 0,30 3 0,219-4 0,-149-6 0,-23-6 0,-70 4 0,42 0 0,-5 0 0,-56 2 0,0 2 0,0 0 0,0 0 0,0 2 0,23 2 0,39 7 0,-56-9 0,-1 1 0,1 1 0,33 10 0,-34-7 0,-1 2 0,1 0 0,-2 1 0,1 0 0,-1 2 0,0 0 0,-1 1 0,-1 0 0,0 2 0,21 22 0,-34-34 0,-1 0 0,1 0 0,0 0 0,0-1 0,0 1 0,0-1 0,0 1 0,1-1 0,-1 0 0,0 0 0,1 0 0,-1 0 0,0-1 0,1 1 0,-1 0 0,1-1 0,-1 0 0,1 0 0,0 0 0,-1 0 0,1 0 0,-1 0 0,1 0 0,-1-1 0,1 0 0,-1 1 0,0-1 0,1 0 0,-1 0 0,0 0 0,1 0 0,-1-1 0,4-2 0,8-7 0,0 0 0,-1 0 0,0-2 0,12-15 0,6-4 0,-20 23 0,0 1 0,1 0 0,0 0 0,0 1 0,0 1 0,1 0 0,0 0 0,1 1 0,21-4 0,10 0 0,73-4 0,-96 11 0,-1-1 0,-1-2 0,1 0 0,-2-2 0,1 0 0,0-1 0,-1-1 0,-1 0 0,0-2 0,22-15 0,-32 18 0,-1 0 0,0-1 0,0 1 0,0-1 0,-1-1 0,-1 1 0,1-1 0,-1 0 0,-1 0 0,0-1 0,3-11 0,10-23 0,-8 24 0,-1 0 0,-1-1 0,0 0 0,-2 0 0,-1 0 0,0-1 0,-2 0 0,-1-35 0,0 48-273,0 0 0,0 0 0,1 1 0,3-12 0,-2 9-6553</inkml:trace>
+</inkml:ink>
+</file>
+
+<file path=ppt/ink/ink10.xml><?xml version="1.0" encoding="utf-8"?>
+<inkml:ink xmlns:inkml="http://www.w3.org/2003/InkML">
+  <inkml:definitions>
+    <inkml:context xml:id="ctx0">
+      <inkml:inkSource xml:id="inkSrc0">
+        <inkml:traceFormat>
+          <inkml:channel name="X" type="integer" min="-2.14748E9" max="2.14748E9" units="cm"/>
+          <inkml:channel name="Y" type="integer" min="-2.14748E9" max="2.14748E9" units="cm"/>
+          <inkml:channel name="F" type="integer" max="32767" units="dev"/>
+        </inkml:traceFormat>
+        <inkml:channelProperties>
+          <inkml:channelProperty channel="X" name="resolution" value="1000" units="1/cm"/>
+          <inkml:channelProperty channel="Y" name="resolution" value="1000" units="1/cm"/>
+          <inkml:channelProperty channel="F" name="resolution" value="0" units="1/dev"/>
+        </inkml:channelProperties>
+      </inkml:inkSource>
+      <inkml:timestamp xml:id="ts0" timeString="2022-07-04T23:47:48.114"/>
+    </inkml:context>
+    <inkml:brush xml:id="br0">
+      <inkml:brushProperty name="width" value="0.05" units="cm"/>
+      <inkml:brushProperty name="height" value="0.05" units="cm"/>
+    </inkml:brush>
+  </inkml:definitions>
+  <inkml:trace contextRef="#ctx0" brushRef="#br0">1 1 24575,'1'0'0,"0"1"0,0-1 0,1 1 0,-1-1 0,0 1 0,0 0 0,0-1 0,0 1 0,1 0 0,-1 0 0,0 0 0,0 0 0,-1 0 0,1 0 0,0 0 0,0 0 0,0 0 0,-1 1 0,2 1 0,13 31 0,-10-23 0,2 7 0,0-1 0,7 38 0,-10-36 0,2 0 0,10 26 0,-14-42 0,0 0 0,0 0 0,1 0 0,-1 0 0,1-1 0,0 1 0,0-1 0,0 1 0,0-1 0,0 0 0,0 0 0,1-1 0,-1 1 0,1-1 0,-1 1 0,8 0 0,67 13 0,-58-12 0,13 0 0,1-1 0,-1-2 0,1-1 0,38-7 0,-34 3 0,0 2 0,66 4 0,-93 1 0,0 0 0,0 1 0,-1 0 0,1 1 0,-1 1 0,17 9 0,56 38 0,-83-52 0,5 3 0,-1-1 0,1 1 0,-1 1 0,0-1 0,0 0 0,0 1 0,0 0 0,-1 0 0,0 0 0,1 1 0,-1-1 0,-1 1 0,1-1 0,-1 1 0,3 6 0,-5-14 0,1 0 0,0-1 0,-1 1 0,2-1 0,-1 1 0,0 0 0,1 0 0,-1 0 0,1 0 0,0 0 0,0 0 0,0 0 0,0 1 0,1-1 0,-1 1 0,1-1 0,-1 1 0,6-4 0,13 2 0,0 0 0,0 1 0,0 0 0,0 2 0,0 1 0,0 1 0,23 3 0,27-1 0,-60-3 0,0 0 0,0-1 0,0-1 0,0 0 0,0 0 0,-1-1 0,1-1 0,-1 0 0,1 0 0,-1-1 0,11-7 0,-16 9 0,1-1 0,-1 0 0,0 0 0,-1 0 0,1 0 0,-1-1 0,0 0 0,0 0 0,0 0 0,-1-1 0,0 1 0,0-1 0,0 0 0,-1 1 0,1-1 0,-1 0 0,-1-1 0,1 1 0,-1 0 0,0-11 0,-3-143-1365,2 145-5461</inkml:trace>
+</inkml:ink>
+</file>
+
+<file path=ppt/ink/ink11.xml><?xml version="1.0" encoding="utf-8"?>
+<inkml:ink xmlns:inkml="http://www.w3.org/2003/InkML">
+  <inkml:definitions>
+    <inkml:context xml:id="ctx0">
+      <inkml:inkSource xml:id="inkSrc0">
+        <inkml:traceFormat>
+          <inkml:channel name="X" type="integer" min="-2.14748E9" max="2.14748E9" units="cm"/>
+          <inkml:channel name="Y" type="integer" min="-2.14748E9" max="2.14748E9" units="cm"/>
+          <inkml:channel name="F" type="integer" max="32767" units="dev"/>
+        </inkml:traceFormat>
+        <inkml:channelProperties>
+          <inkml:channelProperty channel="X" name="resolution" value="1000" units="1/cm"/>
+          <inkml:channelProperty channel="Y" name="resolution" value="1000" units="1/cm"/>
+          <inkml:channelProperty channel="F" name="resolution" value="0" units="1/dev"/>
+        </inkml:channelProperties>
+      </inkml:inkSource>
+      <inkml:timestamp xml:id="ts0" timeString="2022-07-04T23:47:50.491"/>
+    </inkml:context>
+    <inkml:brush xml:id="br0">
+      <inkml:brushProperty name="width" value="0.05" units="cm"/>
+      <inkml:brushProperty name="height" value="0.05" units="cm"/>
+    </inkml:brush>
+  </inkml:definitions>
+  <inkml:trace contextRef="#ctx0" brushRef="#br0">1 1 24575,'0'5'0,"0"0"0,1 1 0,-1-1 0,1 1 0,0-1 0,1 0 0,-1 0 0,1 0 0,0 0 0,1 0 0,-1 0 0,1 0 0,0 0 0,0-1 0,0 0 0,6 6 0,-2-4 0,0 0 0,1 0 0,0 0 0,0-1 0,0 0 0,1-1 0,-1 0 0,16 5 0,10 0 0,0-1 0,1-2 0,66 4 0,146-5 0,-39-2 0,-190-1 0,0 1 0,0 1 0,0 0 0,-1 2 0,26 10 0,42 12 0,330 50 0,25 7 0,-353-63 0,-1 4 0,163 72 0,-218-81 0,-1 2 0,48 37 0,26 18 0,-92-66-124,-1 0 0,0 1 0,-1 0 0,0 0 0,-1 1 0,0 1-1,0-1 1,-1 2 0,0-1 0,9 21 0,-4-11-6702</inkml:trace>
+</inkml:ink>
+</file>
+
+<file path=ppt/ink/ink2.xml><?xml version="1.0" encoding="utf-8"?>
+<inkml:ink xmlns:inkml="http://www.w3.org/2003/InkML">
+  <inkml:definitions>
+    <inkml:context xml:id="ctx0">
+      <inkml:inkSource xml:id="inkSrc0">
+        <inkml:traceFormat>
+          <inkml:channel name="X" type="integer" min="-2.14748E9" max="2.14748E9" units="cm"/>
+          <inkml:channel name="Y" type="integer" min="-2.14748E9" max="2.14748E9" units="cm"/>
+          <inkml:channel name="F" type="integer" max="32767" units="dev"/>
+        </inkml:traceFormat>
+        <inkml:channelProperties>
+          <inkml:channelProperty channel="X" name="resolution" value="1000" units="1/cm"/>
+          <inkml:channelProperty channel="Y" name="resolution" value="1000" units="1/cm"/>
+          <inkml:channelProperty channel="F" name="resolution" value="0" units="1/dev"/>
+        </inkml:channelProperties>
+      </inkml:inkSource>
+      <inkml:timestamp xml:id="ts0" timeString="2022-07-04T23:40:28.081"/>
+    </inkml:context>
+    <inkml:brush xml:id="br0">
+      <inkml:brushProperty name="width" value="0.05" units="cm"/>
+      <inkml:brushProperty name="height" value="0.05" units="cm"/>
+    </inkml:brush>
+  </inkml:definitions>
+  <inkml:trace contextRef="#ctx0" brushRef="#br0">0 70 24575,'1'0'0,"1"1"0,-1 0 0,0 0 0,0 0 0,0 0 0,0 0 0,0 0 0,0 0 0,0 0 0,0 1 0,-1-1 0,1 0 0,0 1 0,-1-1 0,1 0 0,-1 1 0,1-1 0,0 3 0,8 29 0,-8-31 0,9 58 0,-7-42 0,0 1 0,11 34 0,-11-48 0,0 1 0,0-1 0,1 0 0,-1 0 0,1-1 0,0 1 0,0-1 0,0 0 0,1 0 0,0 0 0,0-1 0,0 1 0,0-1 0,0 0 0,0-1 0,1 1 0,10 2 0,-1 0 0,0-1 0,0-1 0,1-1 0,-1 0 0,28 0 0,12-3 0,24 0 0,91-12 0,-156 11 0,1 2 0,0 0 0,0 1 0,0 1 0,-1 0 0,1 1 0,0 0 0,-1 1 0,0 1 0,0 0 0,-1 1 0,1 1 0,-1 0 0,17 12 0,-20-9 0,0 0 0,0 1 0,-1 0 0,-1 1 0,0-1 0,11 24 0,1-2 0,-20-32 0,1 0 0,-1-1 0,1 1 0,-1-1 0,1 1 0,-1-1 0,1 1 0,-1-1 0,1 1 0,0-1 0,-1 0 0,1 1 0,0-1 0,0 0 0,-1 0 0,1 1 0,0-1 0,-1 0 0,1 0 0,0 0 0,0 0 0,-1 0 0,1 0 0,0 0 0,0 0 0,-1 0 0,1 0 0,0 0 0,0-1 0,-1 1 0,1 0 0,0 0 0,-1-1 0,1 1 0,0-1 0,-1 1 0,1 0 0,0-1 0,-1 1 0,1-1 0,-1 0 0,1 1 0,-1-1 0,1 1 0,-1-1 0,0 0 0,1 1 0,-1-1 0,1-1 0,29-45 0,-20 31 0,-3 7 0,1-1 0,0 2 0,0-1 0,1 1 0,0 0 0,1 1 0,-1 0 0,2 0 0,-1 1 0,1 0 0,-1 1 0,1 0 0,1 1 0,-1 0 0,1 1 0,-1 1 0,1-1 0,0 2 0,0-1 0,0 2 0,0 0 0,0 0 0,0 1 0,0 1 0,21 5 0,-4 0 0,1 0 0,-1-1 0,1-2 0,0-1 0,0-2 0,0-1 0,55-6 0,-11-19 0,-32 9 0,-26 10 0,-1-1 0,0-1 0,0 0 0,-1-1 0,0-1 0,17-15 0,-23 17 10,-1-1 0,0 1 0,-1-1 0,0-1 0,-1 1 0,0-1 0,0 0 0,-1 0 0,0 0 0,-1 0 0,3-14 0,0-3-381,-2-1-1,-1 1 1,-1-36 0,-2 48-6455</inkml:trace>
+</inkml:ink>
+</file>
+
+<file path=ppt/ink/ink3.xml><?xml version="1.0" encoding="utf-8"?>
+<inkml:ink xmlns:inkml="http://www.w3.org/2003/InkML">
+  <inkml:definitions>
+    <inkml:context xml:id="ctx0">
+      <inkml:inkSource xml:id="inkSrc0">
+        <inkml:traceFormat>
+          <inkml:channel name="X" type="integer" min="-2.14748E9" max="2.14748E9" units="cm"/>
+          <inkml:channel name="Y" type="integer" min="-2.14748E9" max="2.14748E9" units="cm"/>
+          <inkml:channel name="F" type="integer" max="32767" units="dev"/>
+        </inkml:traceFormat>
+        <inkml:channelProperties>
+          <inkml:channelProperty channel="X" name="resolution" value="1000" units="1/cm"/>
+          <inkml:channelProperty channel="Y" name="resolution" value="1000" units="1/cm"/>
+          <inkml:channelProperty channel="F" name="resolution" value="0" units="1/dev"/>
+        </inkml:channelProperties>
+      </inkml:inkSource>
+      <inkml:timestamp xml:id="ts0" timeString="2022-07-04T23:41:55.572"/>
+    </inkml:context>
+    <inkml:brush xml:id="br0">
+      <inkml:brushProperty name="width" value="0.05" units="cm"/>
+      <inkml:brushProperty name="height" value="0.05" units="cm"/>
+    </inkml:brush>
+  </inkml:definitions>
+  <inkml:trace contextRef="#ctx0" brushRef="#br0">1 181 24575,'2'2'0,"0"0"0,0 0 0,-1 0 0,1 0 0,0 0 0,-1 1 0,1-1 0,-1 0 0,0 1 0,0-1 0,0 1 0,0 0 0,0-1 0,-1 1 0,1 0 0,0 4 0,1 2 0,5 15 0,1 0 0,1 0 0,2-1 0,0 0 0,1-1 0,1 0 0,1-1 0,1-1 0,31 33 0,-41-49 0,-1 0 0,1-1 0,0 0 0,1 0 0,-1 0 0,0-1 0,1 0 0,0 0 0,-1 0 0,1-1 0,0 0 0,0 0 0,0 0 0,0-1 0,0 1 0,10-2 0,8-2 0,-1-1 0,45-13 0,-14 3 0,-50 13 0,1 0 0,-1 1 0,1 0 0,0-1 0,-1 1 0,1 1 0,-1-1 0,1 1 0,-1 0 0,1 0 0,-1 0 0,1 1 0,-1-1 0,0 1 0,0 0 0,0 0 0,0 1 0,0-1 0,0 1 0,-1 0 0,1 0 0,-1 0 0,0 0 0,0 1 0,0-1 0,0 1 0,0 0 0,1 4 0,-3-7 0,-1-1 0,1 1 0,-1 0 0,1-1 0,0 1 0,-1 0 0,1-1 0,-1 1 0,1-1 0,0 1 0,0-1 0,-1 1 0,1-1 0,0 1 0,0-1 0,0 0 0,-1 1 0,1-1 0,0 0 0,0 0 0,0 0 0,0 0 0,0 0 0,0 0 0,-1 0 0,1 0 0,0 0 0,0 0 0,0 0 0,0 0 0,0-1 0,-1 1 0,1 0 0,0-1 0,0 1 0,0-1 0,-1 1 0,1 0 0,0-1 0,-1 0 0,1 1 0,0-1 0,-1 1 0,2-2 0,39-38 0,-25 22 0,-2 7 0,0 0 0,1 1 0,0 0 0,0 2 0,1-1 0,20-6 0,-26 11 0,0 1 0,0 0 0,0 1 0,1 0 0,-1 1 0,1 0 0,-1 0 0,1 1 0,-1 1 0,1 0 0,17 3 0,5 2 0,1-1 0,-1-2 0,1-1 0,45-4 0,-10 0 0,-54 1 0,-1-1 0,1-1 0,-1 0 0,0-1 0,0 0 0,17-9 0,25-6 0,-37 13 0,-1 0 0,0-2 0,0 1 0,-1-2 0,25-16 0,-32 18 0,0 0 0,-1-1 0,0 0 0,-1-1 0,0 0 0,0 0 0,-1 0 0,0-1 0,0 0 0,4-12 0,3-4-118,22-54 367,-35 77-332,1-1 0,-1 0 0,0 0-1,0 0 1,-1 0 0,1 0 0,-1 0 0,0 0 0,0 0 0,0 0 0,0 0 0,-1 0 0,0 0-1,1 0 1,-1 0 0,-1 0 0,-1-3 0,-4-4-6743</inkml:trace>
+</inkml:ink>
+</file>
+
+<file path=ppt/ink/ink4.xml><?xml version="1.0" encoding="utf-8"?>
+<inkml:ink xmlns:inkml="http://www.w3.org/2003/InkML">
+  <inkml:definitions>
+    <inkml:context xml:id="ctx0">
+      <inkml:inkSource xml:id="inkSrc0">
+        <inkml:traceFormat>
+          <inkml:channel name="X" type="integer" min="-2.14748E9" max="2.14748E9" units="cm"/>
+          <inkml:channel name="Y" type="integer" min="-2.14748E9" max="2.14748E9" units="cm"/>
+          <inkml:channel name="F" type="integer" max="32767" units="dev"/>
+        </inkml:traceFormat>
+        <inkml:channelProperties>
+          <inkml:channelProperty channel="X" name="resolution" value="1000" units="1/cm"/>
+          <inkml:channelProperty channel="Y" name="resolution" value="1000" units="1/cm"/>
+          <inkml:channelProperty channel="F" name="resolution" value="0" units="1/dev"/>
+        </inkml:channelProperties>
+      </inkml:inkSource>
+      <inkml:timestamp xml:id="ts0" timeString="2022-07-04T23:44:37.544"/>
+    </inkml:context>
+    <inkml:brush xml:id="br0">
+      <inkml:brushProperty name="width" value="0.05" units="cm"/>
+      <inkml:brushProperty name="height" value="0.05" units="cm"/>
+    </inkml:brush>
+  </inkml:definitions>
+  <inkml:trace contextRef="#ctx0" brushRef="#br0">1 1 24575</inkml:trace>
+</inkml:ink>
+</file>
+
+<file path=ppt/ink/ink5.xml><?xml version="1.0" encoding="utf-8"?>
+<inkml:ink xmlns:inkml="http://www.w3.org/2003/InkML">
+  <inkml:definitions>
+    <inkml:context xml:id="ctx0">
+      <inkml:inkSource xml:id="inkSrc0">
+        <inkml:traceFormat>
+          <inkml:channel name="X" type="integer" min="-2.14748E9" max="2.14748E9" units="cm"/>
+          <inkml:channel name="Y" type="integer" min="-2.14748E9" max="2.14748E9" units="cm"/>
+          <inkml:channel name="F" type="integer" max="32767" units="dev"/>
+        </inkml:traceFormat>
+        <inkml:channelProperties>
+          <inkml:channelProperty channel="X" name="resolution" value="1000" units="1/cm"/>
+          <inkml:channelProperty channel="Y" name="resolution" value="1000" units="1/cm"/>
+          <inkml:channelProperty channel="F" name="resolution" value="0" units="1/dev"/>
+        </inkml:channelProperties>
+      </inkml:inkSource>
+      <inkml:timestamp xml:id="ts0" timeString="2022-07-04T23:45:27.372"/>
+    </inkml:context>
+    <inkml:brush xml:id="br0">
+      <inkml:brushProperty name="width" value="0.05" units="cm"/>
+      <inkml:brushProperty name="height" value="0.05" units="cm"/>
+    </inkml:brush>
+  </inkml:definitions>
+  <inkml:trace contextRef="#ctx0" brushRef="#br0">3 112 24575,'0'25'0,"-2"-9"0,2-1 0,0 0 0,1 1 0,0-1 0,1 0 0,1 0 0,0 0 0,1 0 0,1-1 0,0 1 0,12 22 0,-16-36 0,3 8 0,2 1 0,-1-1 0,1 0 0,1-1 0,0 0 0,0 0 0,0 0 0,1-1 0,0 0 0,0 0 0,1-1 0,13 7 0,152 64 0,-156-68 0,-1 1 0,0 1 0,0 1 0,-1 0 0,0 1 0,16 17 0,1 17 0,-32-47 0,-1 0 0,1 1 0,-1-1 0,1 0 0,-1 0 0,1 0 0,0 0 0,-1-1 0,1 1 0,-1 0 0,1 0 0,-1 0 0,1 0 0,-1 0 0,1-1 0,-1 1 0,1 0 0,-1 0 0,0-1 0,1 1 0,-1 0 0,1-1 0,-1 1 0,0 0 0,1-1 0,-1 1 0,0-1 0,1 1 0,-1-1 0,0 1 0,0-1 0,1 1 0,-1 0 0,0-1 0,0 0 0,0 1 0,0-1 0,0 1 0,1-1 0,-1 1 0,0-1 0,0 1 0,-1-1 0,11-30 0,-10 29 0,1-1 0,0-1 0,0 1 0,1 0 0,-1-1 0,1 1 0,-1 0 0,1 0 0,0 0 0,1 0 0,-1 0 0,0 1 0,1-1 0,-1 1 0,1-1 0,0 1 0,0 0 0,0 0 0,0 0 0,0 1 0,0-1 0,5-1 0,5-1 0,1 1 0,-1 1 0,0 0 0,22-1 0,-26 3 0,0 0 0,1 0 0,-1-2 0,0 1 0,0-1 0,0 0 0,0-1 0,0 0 0,12-6 0,-16 4 0,0 1 0,1-2 0,-1 1 0,-1 0 0,1-1 0,-1 0 0,0 0 0,0 0 0,4-11 0,-4 8 0,1 1 0,0-1 0,0 1 0,1 1 0,7-9 0,-10 11 0,1 0 0,-1 0 0,0 0 0,0 0 0,-1 0 0,1-1 0,-1 1 0,-1-1 0,1 1 0,0-8 0,9-60 0,3-53 0,5 0-1365,-17 109-5461</inkml:trace>
+</inkml:ink>
+</file>
+
+<file path=ppt/ink/ink6.xml><?xml version="1.0" encoding="utf-8"?>
+<inkml:ink xmlns:inkml="http://www.w3.org/2003/InkML">
+  <inkml:definitions>
+    <inkml:context xml:id="ctx0">
+      <inkml:inkSource xml:id="inkSrc0">
+        <inkml:traceFormat>
+          <inkml:channel name="X" type="integer" min="-2.14748E9" max="2.14748E9" units="cm"/>
+          <inkml:channel name="Y" type="integer" min="-2.14748E9" max="2.14748E9" units="cm"/>
+          <inkml:channel name="F" type="integer" max="32767" units="dev"/>
+        </inkml:traceFormat>
+        <inkml:channelProperties>
+          <inkml:channelProperty channel="X" name="resolution" value="1000" units="1/cm"/>
+          <inkml:channelProperty channel="Y" name="resolution" value="1000" units="1/cm"/>
+          <inkml:channelProperty channel="F" name="resolution" value="0" units="1/dev"/>
+        </inkml:channelProperties>
+      </inkml:inkSource>
+      <inkml:timestamp xml:id="ts0" timeString="2022-07-04T23:46:18.842"/>
+    </inkml:context>
+    <inkml:brush xml:id="br0">
+      <inkml:brushProperty name="width" value="0.05" units="cm"/>
+      <inkml:brushProperty name="height" value="0.05" units="cm"/>
+    </inkml:brush>
+  </inkml:definitions>
+  <inkml:trace contextRef="#ctx0" brushRef="#br0">1 87 24575,'17'30'0,"-6"-16"0,-2 5 0,-1 0 0,8 30 0,14 32 0,-27-75 0,1 0 0,-1 0 0,1 0 0,0 0 0,0-1 0,0 0 0,1 1 0,0-2 0,9 8 0,48 41 0,-56-45 0,0-2 0,1 1 0,0-1 0,0 0 0,1 0 0,-1-1 0,1 0 0,0 0 0,1-1 0,-1 0 0,1 0 0,0-1 0,0 0 0,0-1 0,0 0 0,15 1 0,-10-3 0,0-1 0,0-1 0,20-5 0,-26 4 0,1 1 0,0 0 0,0 0 0,0 1 0,0 0 0,0 1 0,0 0 0,-1 0 0,1 1 0,18 4 0,-25-4 0,0 1 0,0-1 0,0 1 0,-1 0 0,1 0 0,0 0 0,-1 0 0,0 0 0,1 0 0,-1 0 0,0 0 0,0 1 0,0-1 0,0 0 0,0 1 0,-1-1 0,1 1 0,-1-1 0,0 0 0,1 1 0,-1-1 0,0 1 0,-1-1 0,1 5 0,-1-10 0,1 0 0,0 0 0,0 0 0,0 0 0,0 0 0,1 0 0,-1 0 0,1 0 0,0 0 0,0 0 0,0 0 0,0 0 0,0 1 0,1-1 0,-1 0 0,1 1 0,-1-1 0,1 1 0,0 0 0,0-1 0,0 1 0,1 0 0,-1 0 0,0 0 0,1 1 0,-1-1 0,1 1 0,0-1 0,-1 1 0,1 0 0,4-2 0,69-3 0,-67 6 0,0 0 0,0 0 0,-1-1 0,1 0 0,0 0 0,0-1 0,-1 0 0,1 0 0,-1-1 0,0 0 0,0-1 0,0 0 0,9-6 0,-10 5 0,-2-1 0,1 1 0,0-1 0,-1 0 0,0 0 0,-1-1 0,1 0 0,-1 1 0,4-11 0,23-69 0,-29 79 0,8-56 0,-9 52 0,0 0 0,0 0 0,2 0 0,5-20 0,-4 19-195,0 0 0,-1 0 0,0-1 0,-1 1 0,0-1 0,-1-14 0,-1 12-6631</inkml:trace>
+</inkml:ink>
+</file>
+
+<file path=ppt/ink/ink7.xml><?xml version="1.0" encoding="utf-8"?>
+<inkml:ink xmlns:inkml="http://www.w3.org/2003/InkML">
+  <inkml:definitions>
+    <inkml:context xml:id="ctx0">
+      <inkml:inkSource xml:id="inkSrc0">
+        <inkml:traceFormat>
+          <inkml:channel name="X" type="integer" min="-2.14748E9" max="2.14748E9" units="cm"/>
+          <inkml:channel name="Y" type="integer" min="-2.14748E9" max="2.14748E9" units="cm"/>
+          <inkml:channel name="F" type="integer" max="32767" units="dev"/>
+        </inkml:traceFormat>
+        <inkml:channelProperties>
+          <inkml:channelProperty channel="X" name="resolution" value="1000" units="1/cm"/>
+          <inkml:channelProperty channel="Y" name="resolution" value="1000" units="1/cm"/>
+          <inkml:channelProperty channel="F" name="resolution" value="0" units="1/dev"/>
+        </inkml:channelProperties>
+      </inkml:inkSource>
+      <inkml:timestamp xml:id="ts0" timeString="2022-07-04T23:46:23.972"/>
+    </inkml:context>
+    <inkml:brush xml:id="br0">
+      <inkml:brushProperty name="width" value="0.05" units="cm"/>
+      <inkml:brushProperty name="height" value="0.05" units="cm"/>
+    </inkml:brush>
+  </inkml:definitions>
+  <inkml:trace contextRef="#ctx0" brushRef="#br0">1 0 24575,'93'164'0,"-34"-64"0,-46-79 0,2-1 0,0 0 0,1-1 0,0 0 0,2-2 0,0 0 0,25 18 0,-7-10 0,1-1 0,1-1 0,49 20 0,-1-10 0,1-4 0,121 24 0,-30-9 0,-171-43-77,63 22 284,-66-22-322,0 1 0,1 0 0,-1 0 0,0 0 0,0 0 0,0 1 0,0 0 0,0-1 0,-1 1 0,1 1 0,-1-1 0,3 4 0,-1 3-6711</inkml:trace>
+</inkml:ink>
+</file>
+
+<file path=ppt/ink/ink8.xml><?xml version="1.0" encoding="utf-8"?>
+<inkml:ink xmlns:inkml="http://www.w3.org/2003/InkML">
+  <inkml:definitions>
+    <inkml:context xml:id="ctx0">
+      <inkml:inkSource xml:id="inkSrc0">
+        <inkml:traceFormat>
+          <inkml:channel name="X" type="integer" min="-2.14748E9" max="2.14748E9" units="cm"/>
+          <inkml:channel name="Y" type="integer" min="-2.14748E9" max="2.14748E9" units="cm"/>
+          <inkml:channel name="F" type="integer" max="32767" units="dev"/>
+        </inkml:traceFormat>
+        <inkml:channelProperties>
+          <inkml:channelProperty channel="X" name="resolution" value="1000" units="1/cm"/>
+          <inkml:channelProperty channel="Y" name="resolution" value="1000" units="1/cm"/>
+          <inkml:channelProperty channel="F" name="resolution" value="0" units="1/dev"/>
+        </inkml:channelProperties>
+      </inkml:inkSource>
+      <inkml:timestamp xml:id="ts0" timeString="2022-07-04T23:46:55.722"/>
+    </inkml:context>
+    <inkml:brush xml:id="br0">
+      <inkml:brushProperty name="width" value="0.05" units="cm"/>
+      <inkml:brushProperty name="height" value="0.05" units="cm"/>
+    </inkml:brush>
+  </inkml:definitions>
+  <inkml:trace contextRef="#ctx0" brushRef="#br0">0 1 24575,'5'6'0,"-1"1"0,0 0 0,0 1 0,-1-1 0,0 1 0,0-1 0,-1 1 0,0 0 0,0 0 0,0 9 0,2 5 0,0-6 0,-1-3 0,0 0 0,1 0 0,7 16 0,-9-25 0,1 0 0,-1 1 0,1-1 0,0-1 0,0 1 0,0 0 0,0-1 0,1 0 0,-1 0 0,1 0 0,0 0 0,0 0 0,5 2 0,2 2 0,0 1 0,0 0 0,0 0 0,-1 1 0,15 19 0,-13-16 0,0 0 0,1 0 0,16 12 0,-9-11 0,1 0 0,0-1 0,0-1 0,1-1 0,1-1 0,-1 0 0,1-2 0,1-1 0,33 4 0,20 7 0,-57-12 0,0 0 0,-1-1 0,22 0 0,-23-4 0,1-2 0,-2 0 0,1-1 0,0-1 0,-1-1 0,1 0 0,-1-1 0,0-1 0,-1-1 0,22-13 0,-10 6 0,0 2 0,39-13 0,-61 24 0,1 1 0,-1 0 0,1 0 0,-1 0 0,1 1 0,-1 0 0,1 0 0,-1 0 0,1 1 0,-1 0 0,1 0 0,-1 1 0,10 4 0,2 2 0,-1 0 0,-1 2 0,20 14 0,-26-17 0,-1 0 0,1 0 0,0-1 0,0 0 0,1-1 0,-1 0 0,1 0 0,0-2 0,1 1 0,-1-1 0,24 2 0,-28-5 0,-1-1 0,1-1 0,0 1 0,-1-1 0,1 0 0,-1-1 0,0 1 0,0-1 0,0-1 0,0 1 0,-1-1 0,1 0 0,-1 0 0,0-1 0,0 1 0,0-1 0,-1 0 0,1 0 0,-1-1 0,-1 1 0,5-9 0,3-4 0,-1-1 0,-1 0 0,-1-1 0,-1 0 0,8-31 0,-6 4-341,-2-1 0,-2-1-1,-3-71 1,-2 104-6485</inkml:trace>
+</inkml:ink>
+</file>
+
+<file path=ppt/ink/ink9.xml><?xml version="1.0" encoding="utf-8"?>
+<inkml:ink xmlns:inkml="http://www.w3.org/2003/InkML">
+  <inkml:definitions>
+    <inkml:context xml:id="ctx0">
+      <inkml:inkSource xml:id="inkSrc0">
+        <inkml:traceFormat>
+          <inkml:channel name="X" type="integer" min="-2.14748E9" max="2.14748E9" units="cm"/>
+          <inkml:channel name="Y" type="integer" min="-2.14748E9" max="2.14748E9" units="cm"/>
+          <inkml:channel name="F" type="integer" max="32767" units="dev"/>
+        </inkml:traceFormat>
+        <inkml:channelProperties>
+          <inkml:channelProperty channel="X" name="resolution" value="1000" units="1/cm"/>
+          <inkml:channelProperty channel="Y" name="resolution" value="1000" units="1/cm"/>
+          <inkml:channelProperty channel="F" name="resolution" value="0" units="1/dev"/>
+        </inkml:channelProperties>
+      </inkml:inkSource>
+      <inkml:timestamp xml:id="ts0" timeString="2022-07-04T23:47:10.704"/>
+    </inkml:context>
+    <inkml:brush xml:id="br0">
+      <inkml:brushProperty name="width" value="0.05" units="cm"/>
+      <inkml:brushProperty name="height" value="0.05" units="cm"/>
+    </inkml:brush>
+  </inkml:definitions>
+  <inkml:trace contextRef="#ctx0" brushRef="#br0">0 0 24575,'2'1'0,"-1"-1"0,1 1 0,-1 0 0,1 0 0,-1-1 0,0 1 0,1 0 0,-1 0 0,0 1 0,0-1 0,0 0 0,0 0 0,0 0 0,0 1 0,0-1 0,0 0 0,0 1 0,0-1 0,-1 1 0,1 1 0,15 36 0,-15-35 0,8 23 0,0-1 0,0-1 0,18 35 0,-21-51 0,0 0 0,0 0 0,1 0 0,0 0 0,1-1 0,0-1 0,0 1 0,1-1 0,10 7 0,5 0 0,0-1 0,0 0 0,1-2 0,47 14 0,108 16 0,-52-14 0,-120-25 0,-1 1 0,0 1 0,0-1 0,0 1 0,0 0 0,0 1 0,-1 0 0,0 0 0,9 9 0,25 19 0,47 19 0,2-4 0,189 73 0,39 3 0,-304-120 0,-1 1 0,1 0 0,-1 1 0,-1 0 0,1 1 0,18 14 0,-25-17 0,-1 1 0,0 0 0,0 0 0,0 0 0,-1 0 0,1 1 0,-1-1 0,-1 1 0,1 0 0,-1 0 0,0 0 0,0 0 0,-1 0 0,0 0 0,0 0 0,0 8 0,1 22-1365,-2-21-5461</inkml:trace>
+</inkml:ink>
+</file>
+
 <file path=ppt/slideLayouts/slideLayout1.xml><?xml version="1.0" encoding="utf-8"?>
 <p:sldLayout xmlns:a="http://schemas.openxmlformats.org/drawingml/2006/main" xmlns:r="http://schemas.openxmlformats.org/officeDocument/2006/relationships" xmlns:p="http://schemas.openxmlformats.org/presentationml/2006/main" type="title" preserve="1">
   <p:cSld name="Title Slide">
@@ -265,7 +564,7 @@
           <a:p>
             <a:fld id="{5611FE8F-1F44-4EAB-BF48-30D9C134CC8B}" type="datetimeFigureOut">
               <a:rPr lang="ru-RU" smtClean="0"/>
-              <a:t>04.07.2022</a:t>
+              <a:t>05.07.2022</a:t>
             </a:fld>
             <a:endParaRPr lang="ru-RU"/>
           </a:p>
@@ -465,7 +764,7 @@
           <a:p>
             <a:fld id="{5611FE8F-1F44-4EAB-BF48-30D9C134CC8B}" type="datetimeFigureOut">
               <a:rPr lang="ru-RU" smtClean="0"/>
-              <a:t>04.07.2022</a:t>
+              <a:t>05.07.2022</a:t>
             </a:fld>
             <a:endParaRPr lang="ru-RU"/>
           </a:p>
@@ -675,7 +974,7 @@
           <a:p>
             <a:fld id="{5611FE8F-1F44-4EAB-BF48-30D9C134CC8B}" type="datetimeFigureOut">
               <a:rPr lang="ru-RU" smtClean="0"/>
-              <a:t>04.07.2022</a:t>
+              <a:t>05.07.2022</a:t>
             </a:fld>
             <a:endParaRPr lang="ru-RU"/>
           </a:p>
@@ -875,7 +1174,7 @@
           <a:p>
             <a:fld id="{5611FE8F-1F44-4EAB-BF48-30D9C134CC8B}" type="datetimeFigureOut">
               <a:rPr lang="ru-RU" smtClean="0"/>
-              <a:t>04.07.2022</a:t>
+              <a:t>05.07.2022</a:t>
             </a:fld>
             <a:endParaRPr lang="ru-RU"/>
           </a:p>
@@ -1151,7 +1450,7 @@
           <a:p>
             <a:fld id="{5611FE8F-1F44-4EAB-BF48-30D9C134CC8B}" type="datetimeFigureOut">
               <a:rPr lang="ru-RU" smtClean="0"/>
-              <a:t>04.07.2022</a:t>
+              <a:t>05.07.2022</a:t>
             </a:fld>
             <a:endParaRPr lang="ru-RU"/>
           </a:p>
@@ -1419,7 +1718,7 @@
           <a:p>
             <a:fld id="{5611FE8F-1F44-4EAB-BF48-30D9C134CC8B}" type="datetimeFigureOut">
               <a:rPr lang="ru-RU" smtClean="0"/>
-              <a:t>04.07.2022</a:t>
+              <a:t>05.07.2022</a:t>
             </a:fld>
             <a:endParaRPr lang="ru-RU"/>
           </a:p>
@@ -1834,7 +2133,7 @@
           <a:p>
             <a:fld id="{5611FE8F-1F44-4EAB-BF48-30D9C134CC8B}" type="datetimeFigureOut">
               <a:rPr lang="ru-RU" smtClean="0"/>
-              <a:t>04.07.2022</a:t>
+              <a:t>05.07.2022</a:t>
             </a:fld>
             <a:endParaRPr lang="ru-RU"/>
           </a:p>
@@ -1976,7 +2275,7 @@
           <a:p>
             <a:fld id="{5611FE8F-1F44-4EAB-BF48-30D9C134CC8B}" type="datetimeFigureOut">
               <a:rPr lang="ru-RU" smtClean="0"/>
-              <a:t>04.07.2022</a:t>
+              <a:t>05.07.2022</a:t>
             </a:fld>
             <a:endParaRPr lang="ru-RU"/>
           </a:p>
@@ -2089,7 +2388,7 @@
           <a:p>
             <a:fld id="{5611FE8F-1F44-4EAB-BF48-30D9C134CC8B}" type="datetimeFigureOut">
               <a:rPr lang="ru-RU" smtClean="0"/>
-              <a:t>04.07.2022</a:t>
+              <a:t>05.07.2022</a:t>
             </a:fld>
             <a:endParaRPr lang="ru-RU"/>
           </a:p>
@@ -2402,7 +2701,7 @@
           <a:p>
             <a:fld id="{5611FE8F-1F44-4EAB-BF48-30D9C134CC8B}" type="datetimeFigureOut">
               <a:rPr lang="ru-RU" smtClean="0"/>
-              <a:t>04.07.2022</a:t>
+              <a:t>05.07.2022</a:t>
             </a:fld>
             <a:endParaRPr lang="ru-RU"/>
           </a:p>
@@ -2691,7 +2990,7 @@
           <a:p>
             <a:fld id="{5611FE8F-1F44-4EAB-BF48-30D9C134CC8B}" type="datetimeFigureOut">
               <a:rPr lang="ru-RU" smtClean="0"/>
-              <a:t>04.07.2022</a:t>
+              <a:t>05.07.2022</a:t>
             </a:fld>
             <a:endParaRPr lang="ru-RU"/>
           </a:p>
@@ -2934,7 +3233,7 @@
           <a:p>
             <a:fld id="{5611FE8F-1F44-4EAB-BF48-30D9C134CC8B}" type="datetimeFigureOut">
               <a:rPr lang="ru-RU" smtClean="0"/>
-              <a:t>04.07.2022</a:t>
+              <a:t>05.07.2022</a:t>
             </a:fld>
             <a:endParaRPr lang="ru-RU"/>
           </a:p>
@@ -4516,12 +4815,24 @@
             </a:r>
             <a:r>
               <a:rPr lang="en-US" dirty="0"/>
-              <a:t> - </a:t>
+              <a:t> – </a:t>
             </a:r>
             <a:r>
               <a:rPr lang="en-US" dirty="0" err="1"/>
               <a:t>analyse</a:t>
             </a:r>
+            <a:r>
+              <a:rPr lang="en-US" dirty="0"/>
+              <a:t> für WD-40 – </a:t>
+            </a:r>
+            <a:r>
+              <a:rPr lang="en-US" dirty="0" err="1"/>
+              <a:t>Gleitmo</a:t>
+            </a:r>
+            <a:r>
+              <a:rPr lang="en-US" dirty="0"/>
+              <a:t> </a:t>
+            </a:r>
             <a:endParaRPr lang="ru-RU" dirty="0"/>
           </a:p>
         </p:txBody>
@@ -4542,7 +4853,12 @@
             <p:ph idx="1"/>
           </p:nvPr>
         </p:nvSpPr>
-        <p:spPr/>
+        <p:spPr>
+          <a:xfrm>
+            <a:off x="838200" y="1825625"/>
+            <a:ext cx="10515600" cy="1393063"/>
+          </a:xfrm>
+        </p:spPr>
         <p:txBody>
           <a:bodyPr/>
           <a:lstStyle/>
@@ -4581,10 +4897,1503 @@
           </a:p>
         </p:txBody>
       </p:sp>
+      <p:pic>
+        <p:nvPicPr>
+          <p:cNvPr id="5" name="Picture 4" descr="Graphical user interface&#10;&#10;Description automatically generated with medium confidence">
+            <a:extLst>
+              <a:ext uri="{FF2B5EF4-FFF2-40B4-BE49-F238E27FC236}">
+                <a16:creationId xmlns:a16="http://schemas.microsoft.com/office/drawing/2014/main" id="{06CC88E0-7825-07AE-2074-2D0B5CFC95C6}"/>
+              </a:ext>
+            </a:extLst>
+          </p:cNvPr>
+          <p:cNvPicPr>
+            <a:picLocks noChangeAspect="1"/>
+          </p:cNvPicPr>
+          <p:nvPr/>
+        </p:nvPicPr>
+        <p:blipFill>
+          <a:blip r:embed="rId2">
+            <a:extLst>
+              <a:ext uri="{28A0092B-C50C-407E-A947-70E740481C1C}">
+                <a14:useLocalDpi xmlns:a14="http://schemas.microsoft.com/office/drawing/2010/main" val="0"/>
+              </a:ext>
+            </a:extLst>
+          </a:blip>
+          <a:stretch>
+            <a:fillRect/>
+          </a:stretch>
+        </p:blipFill>
+        <p:spPr>
+          <a:xfrm>
+            <a:off x="838200" y="2778125"/>
+            <a:ext cx="4953000" cy="3714750"/>
+          </a:xfrm>
+          <a:prstGeom prst="rect">
+            <a:avLst/>
+          </a:prstGeom>
+        </p:spPr>
+      </p:pic>
+      <p:pic>
+        <p:nvPicPr>
+          <p:cNvPr id="7" name="Picture 6" descr="Chart&#10;&#10;Description automatically generated with medium confidence">
+            <a:extLst>
+              <a:ext uri="{FF2B5EF4-FFF2-40B4-BE49-F238E27FC236}">
+                <a16:creationId xmlns:a16="http://schemas.microsoft.com/office/drawing/2014/main" id="{5A266B8E-D91B-C6CE-98A1-11A9AF174F30}"/>
+              </a:ext>
+            </a:extLst>
+          </p:cNvPr>
+          <p:cNvPicPr>
+            <a:picLocks noChangeAspect="1"/>
+          </p:cNvPicPr>
+          <p:nvPr/>
+        </p:nvPicPr>
+        <p:blipFill>
+          <a:blip r:embed="rId3">
+            <a:extLst>
+              <a:ext uri="{28A0092B-C50C-407E-A947-70E740481C1C}">
+                <a14:useLocalDpi xmlns:a14="http://schemas.microsoft.com/office/drawing/2010/main" val="0"/>
+              </a:ext>
+            </a:extLst>
+          </a:blip>
+          <a:stretch>
+            <a:fillRect/>
+          </a:stretch>
+        </p:blipFill>
+        <p:spPr>
+          <a:xfrm>
+            <a:off x="6637786" y="2778125"/>
+            <a:ext cx="4953000" cy="3714750"/>
+          </a:xfrm>
+          <a:prstGeom prst="rect">
+            <a:avLst/>
+          </a:prstGeom>
+        </p:spPr>
+      </p:pic>
     </p:spTree>
     <p:extLst>
       <p:ext uri="{BB962C8B-B14F-4D97-AF65-F5344CB8AC3E}">
         <p14:creationId xmlns:p14="http://schemas.microsoft.com/office/powerpoint/2010/main" val="131493457"/>
+      </p:ext>
+    </p:extLst>
+  </p:cSld>
+  <p:clrMapOvr>
+    <a:masterClrMapping/>
+  </p:clrMapOvr>
+</p:sld>
+</file>
+
+<file path=ppt/slides/slide6.xml><?xml version="1.0" encoding="utf-8"?>
+<p:sld xmlns:a="http://schemas.openxmlformats.org/drawingml/2006/main" xmlns:r="http://schemas.openxmlformats.org/officeDocument/2006/relationships" xmlns:p="http://schemas.openxmlformats.org/presentationml/2006/main">
+  <p:cSld>
+    <p:spTree>
+      <p:nvGrpSpPr>
+        <p:cNvPr id="1" name=""/>
+        <p:cNvGrpSpPr/>
+        <p:nvPr/>
+      </p:nvGrpSpPr>
+      <p:grpSpPr>
+        <a:xfrm>
+          <a:off x="0" y="0"/>
+          <a:ext cx="0" cy="0"/>
+          <a:chOff x="0" y="0"/>
+          <a:chExt cx="0" cy="0"/>
+        </a:xfrm>
+      </p:grpSpPr>
+      <p:sp>
+        <p:nvSpPr>
+          <p:cNvPr id="2" name="Title 1">
+            <a:extLst>
+              <a:ext uri="{FF2B5EF4-FFF2-40B4-BE49-F238E27FC236}">
+                <a16:creationId xmlns:a16="http://schemas.microsoft.com/office/drawing/2014/main" id="{879544D4-FF0A-7F2B-1B1A-241AAB543DAC}"/>
+              </a:ext>
+            </a:extLst>
+          </p:cNvPr>
+          <p:cNvSpPr>
+            <a:spLocks noGrp="1"/>
+          </p:cNvSpPr>
+          <p:nvPr>
+            <p:ph type="title"/>
+          </p:nvPr>
+        </p:nvSpPr>
+        <p:spPr/>
+        <p:txBody>
+          <a:bodyPr/>
+          <a:lstStyle/>
+          <a:p>
+            <a:r>
+              <a:rPr lang="de-DE" dirty="0"/>
+              <a:t>Mean, </a:t>
+            </a:r>
+            <a:r>
+              <a:rPr lang="de-DE" dirty="0" err="1"/>
+              <a:t>std</a:t>
+            </a:r>
+            <a:r>
+              <a:rPr lang="de-DE" dirty="0"/>
+              <a:t> für WD-40 – </a:t>
+            </a:r>
+            <a:r>
+              <a:rPr lang="de-DE" dirty="0" err="1"/>
+              <a:t>Gleitmo</a:t>
+            </a:r>
+            <a:r>
+              <a:rPr lang="de-DE" dirty="0"/>
+              <a:t> </a:t>
+            </a:r>
+            <a:endParaRPr lang="ru-RU" dirty="0"/>
+          </a:p>
+        </p:txBody>
+      </p:sp>
+      <p:pic>
+        <p:nvPicPr>
+          <p:cNvPr id="9" name="Content Placeholder 8" descr="Chart, scatter chart&#10;&#10;Description automatically generated">
+            <a:extLst>
+              <a:ext uri="{FF2B5EF4-FFF2-40B4-BE49-F238E27FC236}">
+                <a16:creationId xmlns:a16="http://schemas.microsoft.com/office/drawing/2014/main" id="{2FA18065-23C3-14BC-8781-85B7BFDB7D45}"/>
+              </a:ext>
+            </a:extLst>
+          </p:cNvPr>
+          <p:cNvPicPr>
+            <a:picLocks noGrp="1" noChangeAspect="1"/>
+          </p:cNvPicPr>
+          <p:nvPr>
+            <p:ph sz="half" idx="2"/>
+          </p:nvPr>
+        </p:nvPicPr>
+        <p:blipFill>
+          <a:blip r:embed="rId2">
+            <a:extLst>
+              <a:ext uri="{28A0092B-C50C-407E-A947-70E740481C1C}">
+                <a14:useLocalDpi xmlns:a14="http://schemas.microsoft.com/office/drawing/2010/main" val="0"/>
+              </a:ext>
+            </a:extLst>
+          </a:blip>
+          <a:stretch>
+            <a:fillRect/>
+          </a:stretch>
+        </p:blipFill>
+        <p:spPr>
+          <a:xfrm>
+            <a:off x="426349" y="2103120"/>
+            <a:ext cx="5448724" cy="4086543"/>
+          </a:xfrm>
+        </p:spPr>
+      </p:pic>
+      <p:pic>
+        <p:nvPicPr>
+          <p:cNvPr id="11" name="Content Placeholder 10" descr="Chart, scatter chart&#10;&#10;Description automatically generated">
+            <a:extLst>
+              <a:ext uri="{FF2B5EF4-FFF2-40B4-BE49-F238E27FC236}">
+                <a16:creationId xmlns:a16="http://schemas.microsoft.com/office/drawing/2014/main" id="{F1E2B598-0938-2523-57D6-5FE7886A99B2}"/>
+              </a:ext>
+            </a:extLst>
+          </p:cNvPr>
+          <p:cNvPicPr>
+            <a:picLocks noGrp="1" noChangeAspect="1"/>
+          </p:cNvPicPr>
+          <p:nvPr>
+            <p:ph sz="quarter" idx="4"/>
+          </p:nvPr>
+        </p:nvPicPr>
+        <p:blipFill>
+          <a:blip r:embed="rId3">
+            <a:extLst>
+              <a:ext uri="{28A0092B-C50C-407E-A947-70E740481C1C}">
+                <a14:useLocalDpi xmlns:a14="http://schemas.microsoft.com/office/drawing/2010/main" val="0"/>
+              </a:ext>
+            </a:extLst>
+          </a:blip>
+          <a:stretch>
+            <a:fillRect/>
+          </a:stretch>
+        </p:blipFill>
+        <p:spPr>
+          <a:xfrm>
+            <a:off x="5780987" y="2103120"/>
+            <a:ext cx="5448724" cy="4086543"/>
+          </a:xfrm>
+        </p:spPr>
+      </p:pic>
+      <p:sp>
+        <p:nvSpPr>
+          <p:cNvPr id="14" name="TextBox 13">
+            <a:extLst>
+              <a:ext uri="{FF2B5EF4-FFF2-40B4-BE49-F238E27FC236}">
+                <a16:creationId xmlns:a16="http://schemas.microsoft.com/office/drawing/2014/main" id="{128E1FF3-2405-796E-119C-53DB0951989C}"/>
+              </a:ext>
+            </a:extLst>
+          </p:cNvPr>
+          <p:cNvSpPr txBox="1"/>
+          <p:nvPr/>
+        </p:nvSpPr>
+        <p:spPr>
+          <a:xfrm>
+            <a:off x="5889004" y="6078275"/>
+            <a:ext cx="1733550" cy="523220"/>
+          </a:xfrm>
+          <a:prstGeom prst="rect">
+            <a:avLst/>
+          </a:prstGeom>
+          <a:noFill/>
+        </p:spPr>
+        <p:txBody>
+          <a:bodyPr wrap="square" rtlCol="0">
+            <a:spAutoFit/>
+          </a:bodyPr>
+          <a:lstStyle/>
+          <a:p>
+            <a:pPr algn="ctr"/>
+            <a:r>
+              <a:rPr lang="de-DE" sz="1400" dirty="0"/>
+              <a:t>WD-40</a:t>
+            </a:r>
+            <a:br>
+              <a:rPr lang="de-DE" sz="1400" dirty="0"/>
+            </a:br>
+            <a:r>
+              <a:rPr lang="de-DE" sz="1400" dirty="0"/>
+              <a:t> </a:t>
+            </a:r>
+            <a:r>
+              <a:rPr lang="de-DE" sz="1400" dirty="0" err="1"/>
+              <a:t>pollution</a:t>
+            </a:r>
+            <a:endParaRPr lang="ru-RU" sz="1400" dirty="0"/>
+          </a:p>
+        </p:txBody>
+      </p:sp>
+      <mc:AlternateContent xmlns:mc="http://schemas.openxmlformats.org/markup-compatibility/2006">
+        <mc:Choice xmlns:p14="http://schemas.microsoft.com/office/powerpoint/2010/main" Requires="p14">
+          <p:contentPart p14:bwMode="auto" r:id="rId4">
+            <p14:nvContentPartPr>
+              <p14:cNvPr id="20" name="Ink 19">
+                <a:extLst>
+                  <a:ext uri="{FF2B5EF4-FFF2-40B4-BE49-F238E27FC236}">
+                    <a16:creationId xmlns:a16="http://schemas.microsoft.com/office/drawing/2014/main" id="{88BC45DA-0ADD-D57B-3448-669A4537FD1B}"/>
+                  </a:ext>
+                </a:extLst>
+              </p14:cNvPr>
+              <p14:cNvContentPartPr/>
+              <p14:nvPr/>
+            </p14:nvContentPartPr>
+            <p14:xfrm>
+              <a:off x="7905770" y="5898210"/>
+              <a:ext cx="957240" cy="281160"/>
+            </p14:xfrm>
+          </p:contentPart>
+        </mc:Choice>
+        <mc:Fallback>
+          <p:pic>
+            <p:nvPicPr>
+              <p:cNvPr id="20" name="Ink 19">
+                <a:extLst>
+                  <a:ext uri="{FF2B5EF4-FFF2-40B4-BE49-F238E27FC236}">
+                    <a16:creationId xmlns:a16="http://schemas.microsoft.com/office/drawing/2014/main" id="{88BC45DA-0ADD-D57B-3448-669A4537FD1B}"/>
+                  </a:ext>
+                </a:extLst>
+              </p:cNvPr>
+              <p:cNvPicPr/>
+              <p:nvPr/>
+            </p:nvPicPr>
+            <p:blipFill>
+              <a:blip r:embed="rId5"/>
+              <a:stretch>
+                <a:fillRect/>
+              </a:stretch>
+            </p:blipFill>
+            <p:spPr>
+              <a:xfrm>
+                <a:off x="7897130" y="5889210"/>
+                <a:ext cx="974880" cy="298800"/>
+              </a:xfrm>
+              <a:prstGeom prst="rect">
+                <a:avLst/>
+              </a:prstGeom>
+            </p:spPr>
+          </p:pic>
+        </mc:Fallback>
+      </mc:AlternateContent>
+      <p:sp>
+        <p:nvSpPr>
+          <p:cNvPr id="22" name="TextBox 21">
+            <a:extLst>
+              <a:ext uri="{FF2B5EF4-FFF2-40B4-BE49-F238E27FC236}">
+                <a16:creationId xmlns:a16="http://schemas.microsoft.com/office/drawing/2014/main" id="{F32148EA-3F40-DA76-3651-6378A629A44C}"/>
+              </a:ext>
+            </a:extLst>
+          </p:cNvPr>
+          <p:cNvSpPr txBox="1"/>
+          <p:nvPr/>
+        </p:nvSpPr>
+        <p:spPr>
+          <a:xfrm>
+            <a:off x="8257234" y="6107010"/>
+            <a:ext cx="1733550" cy="523220"/>
+          </a:xfrm>
+          <a:prstGeom prst="rect">
+            <a:avLst/>
+          </a:prstGeom>
+          <a:noFill/>
+        </p:spPr>
+        <p:txBody>
+          <a:bodyPr wrap="square" rtlCol="0">
+            <a:spAutoFit/>
+          </a:bodyPr>
+          <a:lstStyle/>
+          <a:p>
+            <a:pPr algn="ctr"/>
+            <a:r>
+              <a:rPr lang="de-DE" sz="1400" dirty="0"/>
+              <a:t>WD-40 </a:t>
+            </a:r>
+            <a:br>
+              <a:rPr lang="de-DE" sz="1400" dirty="0"/>
+            </a:br>
+            <a:r>
+              <a:rPr lang="de-DE" sz="1400" dirty="0" err="1"/>
+              <a:t>pollution</a:t>
+            </a:r>
+            <a:endParaRPr lang="ru-RU" sz="1400" dirty="0"/>
+          </a:p>
+        </p:txBody>
+      </p:sp>
+      <mc:AlternateContent xmlns:mc="http://schemas.openxmlformats.org/markup-compatibility/2006">
+        <mc:Choice xmlns:p14="http://schemas.microsoft.com/office/powerpoint/2010/main" Requires="p14">
+          <p:contentPart p14:bwMode="auto" r:id="rId6">
+            <p14:nvContentPartPr>
+              <p14:cNvPr id="26" name="Ink 25">
+                <a:extLst>
+                  <a:ext uri="{FF2B5EF4-FFF2-40B4-BE49-F238E27FC236}">
+                    <a16:creationId xmlns:a16="http://schemas.microsoft.com/office/drawing/2014/main" id="{B9D3157A-F6CE-DE84-B88B-EEA99A4331D5}"/>
+                  </a:ext>
+                </a:extLst>
+              </p14:cNvPr>
+              <p14:cNvContentPartPr/>
+              <p14:nvPr/>
+            </p14:nvContentPartPr>
+            <p14:xfrm>
+              <a:off x="6597530" y="5905770"/>
+              <a:ext cx="673560" cy="201240"/>
+            </p14:xfrm>
+          </p:contentPart>
+        </mc:Choice>
+        <mc:Fallback>
+          <p:pic>
+            <p:nvPicPr>
+              <p:cNvPr id="26" name="Ink 25">
+                <a:extLst>
+                  <a:ext uri="{FF2B5EF4-FFF2-40B4-BE49-F238E27FC236}">
+                    <a16:creationId xmlns:a16="http://schemas.microsoft.com/office/drawing/2014/main" id="{B9D3157A-F6CE-DE84-B88B-EEA99A4331D5}"/>
+                  </a:ext>
+                </a:extLst>
+              </p:cNvPr>
+              <p:cNvPicPr/>
+              <p:nvPr/>
+            </p:nvPicPr>
+            <p:blipFill>
+              <a:blip r:embed="rId7"/>
+              <a:stretch>
+                <a:fillRect/>
+              </a:stretch>
+            </p:blipFill>
+            <p:spPr>
+              <a:xfrm>
+                <a:off x="6588530" y="5897130"/>
+                <a:ext cx="691200" cy="218880"/>
+              </a:xfrm>
+              <a:prstGeom prst="rect">
+                <a:avLst/>
+              </a:prstGeom>
+            </p:spPr>
+          </p:pic>
+        </mc:Fallback>
+      </mc:AlternateContent>
+      <p:cxnSp>
+        <p:nvCxnSpPr>
+          <p:cNvPr id="28" name="Straight Connector 27">
+            <a:extLst>
+              <a:ext uri="{FF2B5EF4-FFF2-40B4-BE49-F238E27FC236}">
+                <a16:creationId xmlns:a16="http://schemas.microsoft.com/office/drawing/2014/main" id="{16ABB4D8-842C-CDF0-3BE5-29E6A02A4DD7}"/>
+              </a:ext>
+            </a:extLst>
+          </p:cNvPr>
+          <p:cNvCxnSpPr/>
+          <p:nvPr/>
+        </p:nvCxnSpPr>
+        <p:spPr>
+          <a:xfrm flipV="1">
+            <a:off x="7271090" y="2603500"/>
+            <a:ext cx="0" cy="3136900"/>
+          </a:xfrm>
+          <a:prstGeom prst="line">
+            <a:avLst/>
+          </a:prstGeom>
+          <a:ln w="12700">
+            <a:solidFill>
+              <a:srgbClr val="FF0000"/>
+            </a:solidFill>
+            <a:prstDash val="sysDash"/>
+          </a:ln>
+        </p:spPr>
+        <p:style>
+          <a:lnRef idx="1">
+            <a:schemeClr val="accent1"/>
+          </a:lnRef>
+          <a:fillRef idx="0">
+            <a:schemeClr val="accent1"/>
+          </a:fillRef>
+          <a:effectRef idx="0">
+            <a:schemeClr val="accent1"/>
+          </a:effectRef>
+          <a:fontRef idx="minor">
+            <a:schemeClr val="tx1"/>
+          </a:fontRef>
+        </p:style>
+      </p:cxnSp>
+      <mc:AlternateContent xmlns:mc="http://schemas.openxmlformats.org/markup-compatibility/2006">
+        <mc:Choice xmlns:p14="http://schemas.microsoft.com/office/powerpoint/2010/main" Requires="p14">
+          <p:contentPart p14:bwMode="auto" r:id="rId8">
+            <p14:nvContentPartPr>
+              <p14:cNvPr id="30" name="Ink 29">
+                <a:extLst>
+                  <a:ext uri="{FF2B5EF4-FFF2-40B4-BE49-F238E27FC236}">
+                    <a16:creationId xmlns:a16="http://schemas.microsoft.com/office/drawing/2014/main" id="{AEA67072-2D24-E65B-9240-BA87B06045E4}"/>
+                  </a:ext>
+                </a:extLst>
+              </p14:cNvPr>
+              <p14:cNvContentPartPr/>
+              <p14:nvPr/>
+            </p14:nvContentPartPr>
+            <p14:xfrm>
+              <a:off x="7276850" y="5840250"/>
+              <a:ext cx="596880" cy="198000"/>
+            </p14:xfrm>
+          </p:contentPart>
+        </mc:Choice>
+        <mc:Fallback>
+          <p:pic>
+            <p:nvPicPr>
+              <p:cNvPr id="30" name="Ink 29">
+                <a:extLst>
+                  <a:ext uri="{FF2B5EF4-FFF2-40B4-BE49-F238E27FC236}">
+                    <a16:creationId xmlns:a16="http://schemas.microsoft.com/office/drawing/2014/main" id="{AEA67072-2D24-E65B-9240-BA87B06045E4}"/>
+                  </a:ext>
+                </a:extLst>
+              </p:cNvPr>
+              <p:cNvPicPr/>
+              <p:nvPr/>
+            </p:nvPicPr>
+            <p:blipFill>
+              <a:blip r:embed="rId9"/>
+              <a:stretch>
+                <a:fillRect/>
+              </a:stretch>
+            </p:blipFill>
+            <p:spPr>
+              <a:xfrm>
+                <a:off x="7268210" y="5831610"/>
+                <a:ext cx="614520" cy="215640"/>
+              </a:xfrm>
+              <a:prstGeom prst="rect">
+                <a:avLst/>
+              </a:prstGeom>
+            </p:spPr>
+          </p:pic>
+        </mc:Fallback>
+      </mc:AlternateContent>
+      <p:sp>
+        <p:nvSpPr>
+          <p:cNvPr id="31" name="TextBox 30">
+            <a:extLst>
+              <a:ext uri="{FF2B5EF4-FFF2-40B4-BE49-F238E27FC236}">
+                <a16:creationId xmlns:a16="http://schemas.microsoft.com/office/drawing/2014/main" id="{1D90D2E3-4DC9-22B2-B69E-074673CD4A30}"/>
+              </a:ext>
+            </a:extLst>
+          </p:cNvPr>
+          <p:cNvSpPr txBox="1"/>
+          <p:nvPr/>
+        </p:nvSpPr>
+        <p:spPr>
+          <a:xfrm>
+            <a:off x="6679802" y="6010738"/>
+            <a:ext cx="1733550" cy="523220"/>
+          </a:xfrm>
+          <a:prstGeom prst="rect">
+            <a:avLst/>
+          </a:prstGeom>
+          <a:noFill/>
+        </p:spPr>
+        <p:txBody>
+          <a:bodyPr wrap="square" rtlCol="0">
+            <a:spAutoFit/>
+          </a:bodyPr>
+          <a:lstStyle/>
+          <a:p>
+            <a:pPr algn="ctr"/>
+            <a:r>
+              <a:rPr lang="de-DE" sz="1400" dirty="0" err="1"/>
+              <a:t>Gleitmo</a:t>
+            </a:r>
+            <a:br>
+              <a:rPr lang="de-DE" sz="1400" dirty="0"/>
+            </a:br>
+            <a:r>
+              <a:rPr lang="de-DE" sz="1400" dirty="0"/>
+              <a:t> </a:t>
+            </a:r>
+            <a:r>
+              <a:rPr lang="de-DE" sz="1400" dirty="0" err="1"/>
+              <a:t>pollution</a:t>
+            </a:r>
+            <a:endParaRPr lang="ru-RU" sz="1400" dirty="0"/>
+          </a:p>
+        </p:txBody>
+      </p:sp>
+      <p:cxnSp>
+        <p:nvCxnSpPr>
+          <p:cNvPr id="32" name="Straight Connector 31">
+            <a:extLst>
+              <a:ext uri="{FF2B5EF4-FFF2-40B4-BE49-F238E27FC236}">
+                <a16:creationId xmlns:a16="http://schemas.microsoft.com/office/drawing/2014/main" id="{1A370443-5D70-21D6-3DCA-2AF02D4A9FA4}"/>
+              </a:ext>
+            </a:extLst>
+          </p:cNvPr>
+          <p:cNvCxnSpPr/>
+          <p:nvPr/>
+        </p:nvCxnSpPr>
+        <p:spPr>
+          <a:xfrm flipV="1">
+            <a:off x="7873730" y="2603500"/>
+            <a:ext cx="0" cy="3136900"/>
+          </a:xfrm>
+          <a:prstGeom prst="line">
+            <a:avLst/>
+          </a:prstGeom>
+          <a:ln w="12700">
+            <a:solidFill>
+              <a:srgbClr val="FF0000"/>
+            </a:solidFill>
+            <a:prstDash val="sysDash"/>
+          </a:ln>
+        </p:spPr>
+        <p:style>
+          <a:lnRef idx="1">
+            <a:schemeClr val="accent1"/>
+          </a:lnRef>
+          <a:fillRef idx="0">
+            <a:schemeClr val="accent1"/>
+          </a:fillRef>
+          <a:effectRef idx="0">
+            <a:schemeClr val="accent1"/>
+          </a:effectRef>
+          <a:fontRef idx="minor">
+            <a:schemeClr val="tx1"/>
+          </a:fontRef>
+        </p:style>
+      </p:cxnSp>
+      <p:sp>
+        <p:nvSpPr>
+          <p:cNvPr id="33" name="TextBox 32">
+            <a:extLst>
+              <a:ext uri="{FF2B5EF4-FFF2-40B4-BE49-F238E27FC236}">
+                <a16:creationId xmlns:a16="http://schemas.microsoft.com/office/drawing/2014/main" id="{0277E959-22D5-0458-7D1F-3A76BFB5D735}"/>
+              </a:ext>
+            </a:extLst>
+          </p:cNvPr>
+          <p:cNvSpPr txBox="1"/>
+          <p:nvPr/>
+        </p:nvSpPr>
+        <p:spPr>
+          <a:xfrm>
+            <a:off x="7470600" y="6166823"/>
+            <a:ext cx="1733550" cy="523220"/>
+          </a:xfrm>
+          <a:prstGeom prst="rect">
+            <a:avLst/>
+          </a:prstGeom>
+          <a:noFill/>
+        </p:spPr>
+        <p:txBody>
+          <a:bodyPr wrap="square" rtlCol="0">
+            <a:spAutoFit/>
+          </a:bodyPr>
+          <a:lstStyle/>
+          <a:p>
+            <a:pPr algn="ctr"/>
+            <a:r>
+              <a:rPr lang="de-DE" sz="1400" dirty="0" err="1"/>
+              <a:t>No</a:t>
+            </a:r>
+            <a:r>
+              <a:rPr lang="de-DE" sz="1400" dirty="0"/>
+              <a:t> </a:t>
+            </a:r>
+            <a:r>
+              <a:rPr lang="de-DE" sz="1400" dirty="0" err="1"/>
+              <a:t>lube</a:t>
+            </a:r>
+            <a:r>
+              <a:rPr lang="de-DE" sz="1400" dirty="0"/>
+              <a:t> </a:t>
+            </a:r>
+            <a:br>
+              <a:rPr lang="de-DE" sz="1400" dirty="0"/>
+            </a:br>
+            <a:r>
+              <a:rPr lang="de-DE" sz="1400" dirty="0" err="1"/>
+              <a:t>pollution</a:t>
+            </a:r>
+            <a:endParaRPr lang="ru-RU" sz="1400" dirty="0"/>
+          </a:p>
+        </p:txBody>
+      </p:sp>
+      <mc:AlternateContent xmlns:mc="http://schemas.openxmlformats.org/markup-compatibility/2006">
+        <mc:Choice xmlns:p14="http://schemas.microsoft.com/office/powerpoint/2010/main" Requires="p14">
+          <p:contentPart p14:bwMode="auto" r:id="rId10">
+            <p14:nvContentPartPr>
+              <p14:cNvPr id="34" name="Ink 33">
+                <a:extLst>
+                  <a:ext uri="{FF2B5EF4-FFF2-40B4-BE49-F238E27FC236}">
+                    <a16:creationId xmlns:a16="http://schemas.microsoft.com/office/drawing/2014/main" id="{7EDACF8A-5728-41D6-5E5E-DDE857EC043E}"/>
+                  </a:ext>
+                </a:extLst>
+              </p14:cNvPr>
+              <p14:cNvContentPartPr/>
+              <p14:nvPr/>
+            </p14:nvContentPartPr>
+            <p14:xfrm>
+              <a:off x="12090050" y="6311490"/>
+              <a:ext cx="360" cy="360"/>
+            </p14:xfrm>
+          </p:contentPart>
+        </mc:Choice>
+        <mc:Fallback>
+          <p:pic>
+            <p:nvPicPr>
+              <p:cNvPr id="34" name="Ink 33">
+                <a:extLst>
+                  <a:ext uri="{FF2B5EF4-FFF2-40B4-BE49-F238E27FC236}">
+                    <a16:creationId xmlns:a16="http://schemas.microsoft.com/office/drawing/2014/main" id="{7EDACF8A-5728-41D6-5E5E-DDE857EC043E}"/>
+                  </a:ext>
+                </a:extLst>
+              </p:cNvPr>
+              <p:cNvPicPr/>
+              <p:nvPr/>
+            </p:nvPicPr>
+            <p:blipFill>
+              <a:blip r:embed="rId11"/>
+              <a:stretch>
+                <a:fillRect/>
+              </a:stretch>
+            </p:blipFill>
+            <p:spPr>
+              <a:xfrm>
+                <a:off x="12081410" y="6302850"/>
+                <a:ext cx="18000" cy="18000"/>
+              </a:xfrm>
+              <a:prstGeom prst="rect">
+                <a:avLst/>
+              </a:prstGeom>
+            </p:spPr>
+          </p:pic>
+        </mc:Fallback>
+      </mc:AlternateContent>
+      <p:cxnSp>
+        <p:nvCxnSpPr>
+          <p:cNvPr id="36" name="Straight Connector 35">
+            <a:extLst>
+              <a:ext uri="{FF2B5EF4-FFF2-40B4-BE49-F238E27FC236}">
+                <a16:creationId xmlns:a16="http://schemas.microsoft.com/office/drawing/2014/main" id="{0780493F-FDE3-4DBE-3B8E-D4CF7C976967}"/>
+              </a:ext>
+            </a:extLst>
+          </p:cNvPr>
+          <p:cNvCxnSpPr/>
+          <p:nvPr/>
+        </p:nvCxnSpPr>
+        <p:spPr>
+          <a:xfrm flipV="1">
+            <a:off x="9216580" y="2577941"/>
+            <a:ext cx="0" cy="3136900"/>
+          </a:xfrm>
+          <a:prstGeom prst="line">
+            <a:avLst/>
+          </a:prstGeom>
+          <a:ln w="12700">
+            <a:solidFill>
+              <a:srgbClr val="FF0000"/>
+            </a:solidFill>
+            <a:prstDash val="sysDash"/>
+          </a:ln>
+        </p:spPr>
+        <p:style>
+          <a:lnRef idx="1">
+            <a:schemeClr val="accent1"/>
+          </a:lnRef>
+          <a:fillRef idx="0">
+            <a:schemeClr val="accent1"/>
+          </a:fillRef>
+          <a:effectRef idx="0">
+            <a:schemeClr val="accent1"/>
+          </a:effectRef>
+          <a:fontRef idx="minor">
+            <a:schemeClr val="tx1"/>
+          </a:fontRef>
+        </p:style>
+      </p:cxnSp>
+      <p:cxnSp>
+        <p:nvCxnSpPr>
+          <p:cNvPr id="37" name="Straight Connector 36">
+            <a:extLst>
+              <a:ext uri="{FF2B5EF4-FFF2-40B4-BE49-F238E27FC236}">
+                <a16:creationId xmlns:a16="http://schemas.microsoft.com/office/drawing/2014/main" id="{8BD5C456-9822-0AA4-AD66-75F06A87C372}"/>
+              </a:ext>
+            </a:extLst>
+          </p:cNvPr>
+          <p:cNvCxnSpPr/>
+          <p:nvPr/>
+        </p:nvCxnSpPr>
+        <p:spPr>
+          <a:xfrm flipV="1">
+            <a:off x="8870570" y="2603500"/>
+            <a:ext cx="0" cy="3136900"/>
+          </a:xfrm>
+          <a:prstGeom prst="line">
+            <a:avLst/>
+          </a:prstGeom>
+          <a:ln w="12700">
+            <a:solidFill>
+              <a:srgbClr val="FF0000"/>
+            </a:solidFill>
+            <a:prstDash val="sysDash"/>
+          </a:ln>
+        </p:spPr>
+        <p:style>
+          <a:lnRef idx="1">
+            <a:schemeClr val="accent1"/>
+          </a:lnRef>
+          <a:fillRef idx="0">
+            <a:schemeClr val="accent1"/>
+          </a:fillRef>
+          <a:effectRef idx="0">
+            <a:schemeClr val="accent1"/>
+          </a:effectRef>
+          <a:fontRef idx="minor">
+            <a:schemeClr val="tx1"/>
+          </a:fontRef>
+        </p:style>
+      </p:cxnSp>
+      <mc:AlternateContent xmlns:mc="http://schemas.openxmlformats.org/markup-compatibility/2006">
+        <mc:Choice xmlns:p14="http://schemas.microsoft.com/office/powerpoint/2010/main" Requires="p14">
+          <p:contentPart p14:bwMode="auto" r:id="rId12">
+            <p14:nvContentPartPr>
+              <p14:cNvPr id="38" name="Ink 37">
+                <a:extLst>
+                  <a:ext uri="{FF2B5EF4-FFF2-40B4-BE49-F238E27FC236}">
+                    <a16:creationId xmlns:a16="http://schemas.microsoft.com/office/drawing/2014/main" id="{CAD1C41A-408F-97F3-B742-CFFBD9331E84}"/>
+                  </a:ext>
+                </a:extLst>
+              </p14:cNvPr>
+              <p14:cNvContentPartPr/>
+              <p14:nvPr/>
+            </p14:nvContentPartPr>
+            <p14:xfrm>
+              <a:off x="8869850" y="5801370"/>
+              <a:ext cx="330840" cy="241920"/>
+            </p14:xfrm>
+          </p:contentPart>
+        </mc:Choice>
+        <mc:Fallback>
+          <p:pic>
+            <p:nvPicPr>
+              <p:cNvPr id="38" name="Ink 37">
+                <a:extLst>
+                  <a:ext uri="{FF2B5EF4-FFF2-40B4-BE49-F238E27FC236}">
+                    <a16:creationId xmlns:a16="http://schemas.microsoft.com/office/drawing/2014/main" id="{CAD1C41A-408F-97F3-B742-CFFBD9331E84}"/>
+                  </a:ext>
+                </a:extLst>
+              </p:cNvPr>
+              <p:cNvPicPr/>
+              <p:nvPr/>
+            </p:nvPicPr>
+            <p:blipFill>
+              <a:blip r:embed="rId13"/>
+              <a:stretch>
+                <a:fillRect/>
+              </a:stretch>
+            </p:blipFill>
+            <p:spPr>
+              <a:xfrm>
+                <a:off x="8861210" y="5792370"/>
+                <a:ext cx="348480" cy="259560"/>
+              </a:xfrm>
+              <a:prstGeom prst="rect">
+                <a:avLst/>
+              </a:prstGeom>
+            </p:spPr>
+          </p:pic>
+        </mc:Fallback>
+      </mc:AlternateContent>
+      <mc:AlternateContent xmlns:mc="http://schemas.openxmlformats.org/markup-compatibility/2006">
+        <mc:Choice xmlns:p14="http://schemas.microsoft.com/office/powerpoint/2010/main" Requires="p14">
+          <p:contentPart p14:bwMode="auto" r:id="rId14">
+            <p14:nvContentPartPr>
+              <p14:cNvPr id="40" name="Ink 39">
+                <a:extLst>
+                  <a:ext uri="{FF2B5EF4-FFF2-40B4-BE49-F238E27FC236}">
+                    <a16:creationId xmlns:a16="http://schemas.microsoft.com/office/drawing/2014/main" id="{1651B027-D6D2-1589-449D-FC0B57946C96}"/>
+                  </a:ext>
+                </a:extLst>
+              </p14:cNvPr>
+              <p14:cNvContentPartPr/>
+              <p14:nvPr/>
+            </p14:nvContentPartPr>
+            <p14:xfrm>
+              <a:off x="9207170" y="5772570"/>
+              <a:ext cx="343800" cy="192960"/>
+            </p14:xfrm>
+          </p:contentPart>
+        </mc:Choice>
+        <mc:Fallback>
+          <p:pic>
+            <p:nvPicPr>
+              <p:cNvPr id="40" name="Ink 39">
+                <a:extLst>
+                  <a:ext uri="{FF2B5EF4-FFF2-40B4-BE49-F238E27FC236}">
+                    <a16:creationId xmlns:a16="http://schemas.microsoft.com/office/drawing/2014/main" id="{1651B027-D6D2-1589-449D-FC0B57946C96}"/>
+                  </a:ext>
+                </a:extLst>
+              </p:cNvPr>
+              <p:cNvPicPr/>
+              <p:nvPr/>
+            </p:nvPicPr>
+            <p:blipFill>
+              <a:blip r:embed="rId15"/>
+              <a:stretch>
+                <a:fillRect/>
+              </a:stretch>
+            </p:blipFill>
+            <p:spPr>
+              <a:xfrm>
+                <a:off x="9198530" y="5763930"/>
+                <a:ext cx="361440" cy="210600"/>
+              </a:xfrm>
+              <a:prstGeom prst="rect">
+                <a:avLst/>
+              </a:prstGeom>
+            </p:spPr>
+          </p:pic>
+        </mc:Fallback>
+      </mc:AlternateContent>
+      <mc:AlternateContent xmlns:mc="http://schemas.openxmlformats.org/markup-compatibility/2006">
+        <mc:Choice xmlns:p14="http://schemas.microsoft.com/office/powerpoint/2010/main" Requires="p14">
+          <p:contentPart p14:bwMode="auto" r:id="rId16">
+            <p14:nvContentPartPr>
+              <p14:cNvPr id="41" name="Ink 40">
+                <a:extLst>
+                  <a:ext uri="{FF2B5EF4-FFF2-40B4-BE49-F238E27FC236}">
+                    <a16:creationId xmlns:a16="http://schemas.microsoft.com/office/drawing/2014/main" id="{E84712A3-EA73-1712-0DF5-C233F4814564}"/>
+                  </a:ext>
+                </a:extLst>
+              </p14:cNvPr>
+              <p14:cNvContentPartPr/>
+              <p14:nvPr/>
+            </p14:nvContentPartPr>
+            <p14:xfrm>
+              <a:off x="9416690" y="5987850"/>
+              <a:ext cx="431640" cy="279720"/>
+            </p14:xfrm>
+          </p:contentPart>
+        </mc:Choice>
+        <mc:Fallback>
+          <p:pic>
+            <p:nvPicPr>
+              <p:cNvPr id="41" name="Ink 40">
+                <a:extLst>
+                  <a:ext uri="{FF2B5EF4-FFF2-40B4-BE49-F238E27FC236}">
+                    <a16:creationId xmlns:a16="http://schemas.microsoft.com/office/drawing/2014/main" id="{E84712A3-EA73-1712-0DF5-C233F4814564}"/>
+                  </a:ext>
+                </a:extLst>
+              </p:cNvPr>
+              <p:cNvPicPr/>
+              <p:nvPr/>
+            </p:nvPicPr>
+            <p:blipFill>
+              <a:blip r:embed="rId17"/>
+              <a:stretch>
+                <a:fillRect/>
+              </a:stretch>
+            </p:blipFill>
+            <p:spPr>
+              <a:xfrm>
+                <a:off x="9408050" y="5978850"/>
+                <a:ext cx="449280" cy="297360"/>
+              </a:xfrm>
+              <a:prstGeom prst="rect">
+                <a:avLst/>
+              </a:prstGeom>
+            </p:spPr>
+          </p:pic>
+        </mc:Fallback>
+      </mc:AlternateContent>
+      <p:sp>
+        <p:nvSpPr>
+          <p:cNvPr id="42" name="TextBox 41">
+            <a:extLst>
+              <a:ext uri="{FF2B5EF4-FFF2-40B4-BE49-F238E27FC236}">
+                <a16:creationId xmlns:a16="http://schemas.microsoft.com/office/drawing/2014/main" id="{BFADBA1A-4DAB-A0A9-E1BA-DC7395630CD8}"/>
+              </a:ext>
+            </a:extLst>
+          </p:cNvPr>
+          <p:cNvSpPr txBox="1"/>
+          <p:nvPr/>
+        </p:nvSpPr>
+        <p:spPr>
+          <a:xfrm>
+            <a:off x="9043868" y="6255371"/>
+            <a:ext cx="1733550" cy="523220"/>
+          </a:xfrm>
+          <a:prstGeom prst="rect">
+            <a:avLst/>
+          </a:prstGeom>
+          <a:noFill/>
+        </p:spPr>
+        <p:txBody>
+          <a:bodyPr wrap="square" rtlCol="0">
+            <a:spAutoFit/>
+          </a:bodyPr>
+          <a:lstStyle/>
+          <a:p>
+            <a:pPr algn="ctr"/>
+            <a:r>
+              <a:rPr lang="de-DE" sz="1400" dirty="0" err="1"/>
+              <a:t>No</a:t>
+            </a:r>
+            <a:r>
+              <a:rPr lang="de-DE" sz="1400" dirty="0"/>
+              <a:t> </a:t>
+            </a:r>
+            <a:r>
+              <a:rPr lang="de-DE" sz="1400" dirty="0" err="1"/>
+              <a:t>lube</a:t>
+            </a:r>
+            <a:r>
+              <a:rPr lang="de-DE" sz="1400" dirty="0"/>
+              <a:t> </a:t>
+            </a:r>
+            <a:br>
+              <a:rPr lang="de-DE" sz="1400" dirty="0"/>
+            </a:br>
+            <a:r>
+              <a:rPr lang="de-DE" sz="1400" dirty="0" err="1"/>
+              <a:t>pollution</a:t>
+            </a:r>
+            <a:endParaRPr lang="ru-RU" sz="1400" dirty="0"/>
+          </a:p>
+        </p:txBody>
+      </p:sp>
+      <mc:AlternateContent xmlns:mc="http://schemas.openxmlformats.org/markup-compatibility/2006">
+        <mc:Choice xmlns:p14="http://schemas.microsoft.com/office/powerpoint/2010/main" Requires="p14">
+          <p:contentPart p14:bwMode="auto" r:id="rId18">
+            <p14:nvContentPartPr>
+              <p14:cNvPr id="43" name="Ink 42">
+                <a:extLst>
+                  <a:ext uri="{FF2B5EF4-FFF2-40B4-BE49-F238E27FC236}">
+                    <a16:creationId xmlns:a16="http://schemas.microsoft.com/office/drawing/2014/main" id="{07960635-720B-B9D5-E54F-703AE649EE48}"/>
+                  </a:ext>
+                </a:extLst>
+              </p14:cNvPr>
+              <p14:cNvContentPartPr/>
+              <p14:nvPr/>
+            </p14:nvContentPartPr>
+            <p14:xfrm>
+              <a:off x="9543770" y="5790930"/>
+              <a:ext cx="565560" cy="185040"/>
+            </p14:xfrm>
+          </p:contentPart>
+        </mc:Choice>
+        <mc:Fallback>
+          <p:pic>
+            <p:nvPicPr>
+              <p:cNvPr id="43" name="Ink 42">
+                <a:extLst>
+                  <a:ext uri="{FF2B5EF4-FFF2-40B4-BE49-F238E27FC236}">
+                    <a16:creationId xmlns:a16="http://schemas.microsoft.com/office/drawing/2014/main" id="{07960635-720B-B9D5-E54F-703AE649EE48}"/>
+                  </a:ext>
+                </a:extLst>
+              </p:cNvPr>
+              <p:cNvPicPr/>
+              <p:nvPr/>
+            </p:nvPicPr>
+            <p:blipFill>
+              <a:blip r:embed="rId19"/>
+              <a:stretch>
+                <a:fillRect/>
+              </a:stretch>
+            </p:blipFill>
+            <p:spPr>
+              <a:xfrm>
+                <a:off x="9534770" y="5782290"/>
+                <a:ext cx="583200" cy="202680"/>
+              </a:xfrm>
+              <a:prstGeom prst="rect">
+                <a:avLst/>
+              </a:prstGeom>
+            </p:spPr>
+          </p:pic>
+        </mc:Fallback>
+      </mc:AlternateContent>
+      <mc:AlternateContent xmlns:mc="http://schemas.openxmlformats.org/markup-compatibility/2006">
+        <mc:Choice xmlns:p14="http://schemas.microsoft.com/office/powerpoint/2010/main" Requires="p14">
+          <p:contentPart p14:bwMode="auto" r:id="rId20">
+            <p14:nvContentPartPr>
+              <p14:cNvPr id="44" name="Ink 43">
+                <a:extLst>
+                  <a:ext uri="{FF2B5EF4-FFF2-40B4-BE49-F238E27FC236}">
+                    <a16:creationId xmlns:a16="http://schemas.microsoft.com/office/drawing/2014/main" id="{2FBD6165-1D33-46DB-0309-6B14A485C3B9}"/>
+                  </a:ext>
+                </a:extLst>
+              </p14:cNvPr>
+              <p14:cNvContentPartPr/>
+              <p14:nvPr/>
+            </p14:nvContentPartPr>
+            <p14:xfrm>
+              <a:off x="9867770" y="5956170"/>
+              <a:ext cx="610560" cy="386640"/>
+            </p14:xfrm>
+          </p:contentPart>
+        </mc:Choice>
+        <mc:Fallback>
+          <p:pic>
+            <p:nvPicPr>
+              <p:cNvPr id="44" name="Ink 43">
+                <a:extLst>
+                  <a:ext uri="{FF2B5EF4-FFF2-40B4-BE49-F238E27FC236}">
+                    <a16:creationId xmlns:a16="http://schemas.microsoft.com/office/drawing/2014/main" id="{2FBD6165-1D33-46DB-0309-6B14A485C3B9}"/>
+                  </a:ext>
+                </a:extLst>
+              </p:cNvPr>
+              <p:cNvPicPr/>
+              <p:nvPr/>
+            </p:nvPicPr>
+            <p:blipFill>
+              <a:blip r:embed="rId21"/>
+              <a:stretch>
+                <a:fillRect/>
+              </a:stretch>
+            </p:blipFill>
+            <p:spPr>
+              <a:xfrm>
+                <a:off x="9858770" y="5947170"/>
+                <a:ext cx="628200" cy="404280"/>
+              </a:xfrm>
+              <a:prstGeom prst="rect">
+                <a:avLst/>
+              </a:prstGeom>
+            </p:spPr>
+          </p:pic>
+        </mc:Fallback>
+      </mc:AlternateContent>
+      <p:sp>
+        <p:nvSpPr>
+          <p:cNvPr id="45" name="TextBox 44">
+            <a:extLst>
+              <a:ext uri="{FF2B5EF4-FFF2-40B4-BE49-F238E27FC236}">
+                <a16:creationId xmlns:a16="http://schemas.microsoft.com/office/drawing/2014/main" id="{7EA5C461-BAD8-53CD-34C3-A64B24B88FA2}"/>
+              </a:ext>
+            </a:extLst>
+          </p:cNvPr>
+          <p:cNvSpPr txBox="1"/>
+          <p:nvPr/>
+        </p:nvSpPr>
+        <p:spPr>
+          <a:xfrm>
+            <a:off x="9834666" y="6290000"/>
+            <a:ext cx="1733550" cy="523220"/>
+          </a:xfrm>
+          <a:prstGeom prst="rect">
+            <a:avLst/>
+          </a:prstGeom>
+          <a:noFill/>
+        </p:spPr>
+        <p:txBody>
+          <a:bodyPr wrap="square" rtlCol="0">
+            <a:spAutoFit/>
+          </a:bodyPr>
+          <a:lstStyle/>
+          <a:p>
+            <a:pPr algn="ctr"/>
+            <a:r>
+              <a:rPr lang="de-DE" sz="1400" dirty="0" err="1"/>
+              <a:t>Gleitmo</a:t>
+            </a:r>
+            <a:br>
+              <a:rPr lang="de-DE" sz="1400" dirty="0"/>
+            </a:br>
+            <a:r>
+              <a:rPr lang="de-DE" sz="1400" dirty="0"/>
+              <a:t> </a:t>
+            </a:r>
+            <a:r>
+              <a:rPr lang="de-DE" sz="1400" dirty="0" err="1"/>
+              <a:t>pollution</a:t>
+            </a:r>
+            <a:endParaRPr lang="ru-RU" sz="1400" dirty="0"/>
+          </a:p>
+        </p:txBody>
+      </p:sp>
+      <p:sp>
+        <p:nvSpPr>
+          <p:cNvPr id="46" name="TextBox 45">
+            <a:extLst>
+              <a:ext uri="{FF2B5EF4-FFF2-40B4-BE49-F238E27FC236}">
+                <a16:creationId xmlns:a16="http://schemas.microsoft.com/office/drawing/2014/main" id="{FE6814F6-464F-2370-9DC1-34FB47EC0FAB}"/>
+              </a:ext>
+            </a:extLst>
+          </p:cNvPr>
+          <p:cNvSpPr txBox="1"/>
+          <p:nvPr/>
+        </p:nvSpPr>
+        <p:spPr>
+          <a:xfrm>
+            <a:off x="10625464" y="6277801"/>
+            <a:ext cx="1733550" cy="523220"/>
+          </a:xfrm>
+          <a:prstGeom prst="rect">
+            <a:avLst/>
+          </a:prstGeom>
+          <a:noFill/>
+        </p:spPr>
+        <p:txBody>
+          <a:bodyPr wrap="square" rtlCol="0">
+            <a:spAutoFit/>
+          </a:bodyPr>
+          <a:lstStyle/>
+          <a:p>
+            <a:pPr algn="ctr"/>
+            <a:r>
+              <a:rPr lang="de-DE" sz="1400" dirty="0"/>
+              <a:t>WD-40 </a:t>
+            </a:r>
+            <a:br>
+              <a:rPr lang="de-DE" sz="1400" dirty="0"/>
+            </a:br>
+            <a:r>
+              <a:rPr lang="de-DE" sz="1400" dirty="0" err="1"/>
+              <a:t>pollution</a:t>
+            </a:r>
+            <a:endParaRPr lang="ru-RU" sz="1400" dirty="0"/>
+          </a:p>
+        </p:txBody>
+      </p:sp>
+      <p:grpSp>
+        <p:nvGrpSpPr>
+          <p:cNvPr id="49" name="Group 48">
+            <a:extLst>
+              <a:ext uri="{FF2B5EF4-FFF2-40B4-BE49-F238E27FC236}">
+                <a16:creationId xmlns:a16="http://schemas.microsoft.com/office/drawing/2014/main" id="{641DC727-EA33-1390-06BC-D6E5195252DC}"/>
+              </a:ext>
+            </a:extLst>
+          </p:cNvPr>
+          <p:cNvGrpSpPr/>
+          <p:nvPr/>
+        </p:nvGrpSpPr>
+        <p:grpSpPr>
+          <a:xfrm>
+            <a:off x="10121570" y="5797050"/>
+            <a:ext cx="1276560" cy="479160"/>
+            <a:chOff x="10121570" y="5797050"/>
+            <a:chExt cx="1276560" cy="479160"/>
+          </a:xfrm>
+        </p:grpSpPr>
+        <mc:AlternateContent xmlns:mc="http://schemas.openxmlformats.org/markup-compatibility/2006">
+          <mc:Choice xmlns:p14="http://schemas.microsoft.com/office/powerpoint/2010/main" Requires="p14">
+            <p:contentPart p14:bwMode="auto" r:id="rId22">
+              <p14:nvContentPartPr>
+                <p14:cNvPr id="47" name="Ink 46">
+                  <a:extLst>
+                    <a:ext uri="{FF2B5EF4-FFF2-40B4-BE49-F238E27FC236}">
+                      <a16:creationId xmlns:a16="http://schemas.microsoft.com/office/drawing/2014/main" id="{E31A29F3-02BE-A5B9-D649-6255FC22187E}"/>
+                    </a:ext>
+                  </a:extLst>
+                </p14:cNvPr>
+                <p14:cNvContentPartPr/>
+                <p14:nvPr/>
+              </p14:nvContentPartPr>
+              <p14:xfrm>
+                <a:off x="10121570" y="5797050"/>
+                <a:ext cx="496440" cy="157320"/>
+              </p14:xfrm>
+            </p:contentPart>
+          </mc:Choice>
+          <mc:Fallback>
+            <p:pic>
+              <p:nvPicPr>
+                <p:cNvPr id="47" name="Ink 46">
+                  <a:extLst>
+                    <a:ext uri="{FF2B5EF4-FFF2-40B4-BE49-F238E27FC236}">
+                      <a16:creationId xmlns:a16="http://schemas.microsoft.com/office/drawing/2014/main" id="{E31A29F3-02BE-A5B9-D649-6255FC22187E}"/>
+                    </a:ext>
+                  </a:extLst>
+                </p:cNvPr>
+                <p:cNvPicPr/>
+                <p:nvPr/>
+              </p:nvPicPr>
+              <p:blipFill>
+                <a:blip r:embed="rId23"/>
+                <a:stretch>
+                  <a:fillRect/>
+                </a:stretch>
+              </p:blipFill>
+              <p:spPr>
+                <a:xfrm>
+                  <a:off x="10112930" y="5788410"/>
+                  <a:ext cx="514080" cy="174960"/>
+                </a:xfrm>
+                <a:prstGeom prst="rect">
+                  <a:avLst/>
+                </a:prstGeom>
+              </p:spPr>
+            </p:pic>
+          </mc:Fallback>
+        </mc:AlternateContent>
+        <mc:AlternateContent xmlns:mc="http://schemas.openxmlformats.org/markup-compatibility/2006">
+          <mc:Choice xmlns:p14="http://schemas.microsoft.com/office/powerpoint/2010/main" Requires="p14">
+            <p:contentPart p14:bwMode="auto" r:id="rId24">
+              <p14:nvContentPartPr>
+                <p14:cNvPr id="48" name="Ink 47">
+                  <a:extLst>
+                    <a:ext uri="{FF2B5EF4-FFF2-40B4-BE49-F238E27FC236}">
+                      <a16:creationId xmlns:a16="http://schemas.microsoft.com/office/drawing/2014/main" id="{C3C13F50-E219-94EA-E277-8CD6EA6742DA}"/>
+                    </a:ext>
+                  </a:extLst>
+                </p14:cNvPr>
+                <p14:cNvContentPartPr/>
+                <p14:nvPr/>
+              </p14:nvContentPartPr>
+              <p14:xfrm>
+                <a:off x="10445210" y="5962290"/>
+                <a:ext cx="952920" cy="313920"/>
+              </p14:xfrm>
+            </p:contentPart>
+          </mc:Choice>
+          <mc:Fallback>
+            <p:pic>
+              <p:nvPicPr>
+                <p:cNvPr id="48" name="Ink 47">
+                  <a:extLst>
+                    <a:ext uri="{FF2B5EF4-FFF2-40B4-BE49-F238E27FC236}">
+                      <a16:creationId xmlns:a16="http://schemas.microsoft.com/office/drawing/2014/main" id="{C3C13F50-E219-94EA-E277-8CD6EA6742DA}"/>
+                    </a:ext>
+                  </a:extLst>
+                </p:cNvPr>
+                <p:cNvPicPr/>
+                <p:nvPr/>
+              </p:nvPicPr>
+              <p:blipFill>
+                <a:blip r:embed="rId25"/>
+                <a:stretch>
+                  <a:fillRect/>
+                </a:stretch>
+              </p:blipFill>
+              <p:spPr>
+                <a:xfrm>
+                  <a:off x="10436570" y="5953650"/>
+                  <a:ext cx="970560" cy="331560"/>
+                </a:xfrm>
+                <a:prstGeom prst="rect">
+                  <a:avLst/>
+                </a:prstGeom>
+              </p:spPr>
+            </p:pic>
+          </mc:Fallback>
+        </mc:AlternateContent>
+      </p:grpSp>
+      <p:cxnSp>
+        <p:nvCxnSpPr>
+          <p:cNvPr id="51" name="Straight Connector 50">
+            <a:extLst>
+              <a:ext uri="{FF2B5EF4-FFF2-40B4-BE49-F238E27FC236}">
+                <a16:creationId xmlns:a16="http://schemas.microsoft.com/office/drawing/2014/main" id="{9A8E9B24-4D5A-7892-06B2-93C7706C5565}"/>
+              </a:ext>
+            </a:extLst>
+          </p:cNvPr>
+          <p:cNvCxnSpPr/>
+          <p:nvPr/>
+        </p:nvCxnSpPr>
+        <p:spPr>
+          <a:xfrm flipV="1">
+            <a:off x="9543770" y="2603500"/>
+            <a:ext cx="0" cy="3136900"/>
+          </a:xfrm>
+          <a:prstGeom prst="line">
+            <a:avLst/>
+          </a:prstGeom>
+          <a:ln w="12700">
+            <a:solidFill>
+              <a:srgbClr val="FF0000"/>
+            </a:solidFill>
+            <a:prstDash val="sysDash"/>
+          </a:ln>
+        </p:spPr>
+        <p:style>
+          <a:lnRef idx="1">
+            <a:schemeClr val="accent1"/>
+          </a:lnRef>
+          <a:fillRef idx="0">
+            <a:schemeClr val="accent1"/>
+          </a:fillRef>
+          <a:effectRef idx="0">
+            <a:schemeClr val="accent1"/>
+          </a:effectRef>
+          <a:fontRef idx="minor">
+            <a:schemeClr val="tx1"/>
+          </a:fontRef>
+        </p:style>
+      </p:cxnSp>
+      <p:cxnSp>
+        <p:nvCxnSpPr>
+          <p:cNvPr id="52" name="Straight Connector 51">
+            <a:extLst>
+              <a:ext uri="{FF2B5EF4-FFF2-40B4-BE49-F238E27FC236}">
+                <a16:creationId xmlns:a16="http://schemas.microsoft.com/office/drawing/2014/main" id="{8F6E6196-C85A-B5CF-3684-86B7B7645970}"/>
+              </a:ext>
+            </a:extLst>
+          </p:cNvPr>
+          <p:cNvCxnSpPr/>
+          <p:nvPr/>
+        </p:nvCxnSpPr>
+        <p:spPr>
+          <a:xfrm flipV="1">
+            <a:off x="10131110" y="2603500"/>
+            <a:ext cx="0" cy="3136900"/>
+          </a:xfrm>
+          <a:prstGeom prst="line">
+            <a:avLst/>
+          </a:prstGeom>
+          <a:ln w="12700">
+            <a:solidFill>
+              <a:srgbClr val="FF0000"/>
+            </a:solidFill>
+            <a:prstDash val="sysDash"/>
+          </a:ln>
+        </p:spPr>
+        <p:style>
+          <a:lnRef idx="1">
+            <a:schemeClr val="accent1"/>
+          </a:lnRef>
+          <a:fillRef idx="0">
+            <a:schemeClr val="accent1"/>
+          </a:fillRef>
+          <a:effectRef idx="0">
+            <a:schemeClr val="accent1"/>
+          </a:effectRef>
+          <a:fontRef idx="minor">
+            <a:schemeClr val="tx1"/>
+          </a:fontRef>
+        </p:style>
+      </p:cxnSp>
+    </p:spTree>
+    <p:extLst>
+      <p:ext uri="{BB962C8B-B14F-4D97-AF65-F5344CB8AC3E}">
+        <p14:creationId xmlns:p14="http://schemas.microsoft.com/office/powerpoint/2010/main" val="772004425"/>
+      </p:ext>
+    </p:extLst>
+  </p:cSld>
+  <p:clrMapOvr>
+    <a:masterClrMapping/>
+  </p:clrMapOvr>
+</p:sld>
+</file>
+
+<file path=ppt/slides/slide7.xml><?xml version="1.0" encoding="utf-8"?>
+<p:sld xmlns:a="http://schemas.openxmlformats.org/drawingml/2006/main" xmlns:r="http://schemas.openxmlformats.org/officeDocument/2006/relationships" xmlns:p="http://schemas.openxmlformats.org/presentationml/2006/main">
+  <p:cSld>
+    <p:spTree>
+      <p:nvGrpSpPr>
+        <p:cNvPr id="1" name=""/>
+        <p:cNvGrpSpPr/>
+        <p:nvPr/>
+      </p:nvGrpSpPr>
+      <p:grpSpPr>
+        <a:xfrm>
+          <a:off x="0" y="0"/>
+          <a:ext cx="0" cy="0"/>
+          <a:chOff x="0" y="0"/>
+          <a:chExt cx="0" cy="0"/>
+        </a:xfrm>
+      </p:grpSpPr>
+      <p:sp>
+        <p:nvSpPr>
+          <p:cNvPr id="9" name="Title 8">
+            <a:extLst>
+              <a:ext uri="{FF2B5EF4-FFF2-40B4-BE49-F238E27FC236}">
+                <a16:creationId xmlns:a16="http://schemas.microsoft.com/office/drawing/2014/main" id="{4000EA98-D534-8567-8667-18001E21135A}"/>
+              </a:ext>
+            </a:extLst>
+          </p:cNvPr>
+          <p:cNvSpPr>
+            <a:spLocks noGrp="1"/>
+          </p:cNvSpPr>
+          <p:nvPr>
+            <p:ph type="title"/>
+          </p:nvPr>
+        </p:nvSpPr>
+        <p:spPr/>
+        <p:txBody>
+          <a:bodyPr/>
+          <a:lstStyle/>
+          <a:p>
+            <a:r>
+              <a:rPr lang="de-DE" dirty="0"/>
+              <a:t>RMS </a:t>
+            </a:r>
+            <a:r>
+              <a:rPr lang="de-DE" dirty="0" err="1"/>
+              <a:t>values</a:t>
+            </a:r>
+            <a:endParaRPr lang="ru-RU" dirty="0"/>
+          </a:p>
+        </p:txBody>
+      </p:sp>
+      <p:pic>
+        <p:nvPicPr>
+          <p:cNvPr id="8" name="Content Placeholder 7" descr="Chart, scatter chart&#10;&#10;Description automatically generated">
+            <a:extLst>
+              <a:ext uri="{FF2B5EF4-FFF2-40B4-BE49-F238E27FC236}">
+                <a16:creationId xmlns:a16="http://schemas.microsoft.com/office/drawing/2014/main" id="{74365190-49F1-60B9-CE00-97069CD2CCF9}"/>
+              </a:ext>
+            </a:extLst>
+          </p:cNvPr>
+          <p:cNvPicPr>
+            <a:picLocks noGrp="1" noChangeAspect="1"/>
+          </p:cNvPicPr>
+          <p:nvPr>
+            <p:ph idx="1"/>
+          </p:nvPr>
+        </p:nvPicPr>
+        <p:blipFill>
+          <a:blip r:embed="rId2">
+            <a:extLst>
+              <a:ext uri="{28A0092B-C50C-407E-A947-70E740481C1C}">
+                <a14:useLocalDpi xmlns:a14="http://schemas.microsoft.com/office/drawing/2010/main" val="0"/>
+              </a:ext>
+            </a:extLst>
+          </a:blip>
+          <a:stretch>
+            <a:fillRect/>
+          </a:stretch>
+        </p:blipFill>
+        <p:spPr>
+          <a:xfrm>
+            <a:off x="3195108" y="1825625"/>
+            <a:ext cx="5801784" cy="4351338"/>
+          </a:xfrm>
+        </p:spPr>
+      </p:pic>
+    </p:spTree>
+    <p:extLst>
+      <p:ext uri="{BB962C8B-B14F-4D97-AF65-F5344CB8AC3E}">
+        <p14:creationId xmlns:p14="http://schemas.microsoft.com/office/powerpoint/2010/main" val="2014066205"/>
       </p:ext>
     </p:extLst>
   </p:cSld>

</xml_diff>